<commit_message>
Translate remaining English images in Spanish console guide
</commit_message>
<xml_diff>
--- a/Guides/Spanish/Editable source images/Imágenes Guías - Cómo funciona la consola.pptx
+++ b/Guides/Spanish/Editable source images/Imágenes Guías - Cómo funciona la consola.pptx
@@ -126,7 +126,7 @@
   </p:defaultTextStyle>
   <p:extLst>
     <p:ext uri="{EFAFB233-063F-42B5-8137-9DF3F51BA10A}">
-      <p15:sldGuideLst xmlns="" xmlns:p15="http://schemas.microsoft.com/office/powerpoint/2012/main">
+      <p15:sldGuideLst xmlns:p15="http://schemas.microsoft.com/office/powerpoint/2012/main" xmlns="">
         <p15:guide id="1" orient="horz" pos="2160">
           <p15:clr>
             <a:srgbClr val="A4A3A4"/>
@@ -165,7 +165,7 @@
           <p:cNvPr id="2" name="Título 1">
             <a:extLst>
               <a:ext uri="{FF2B5EF4-FFF2-40B4-BE49-F238E27FC236}">
-                <a16:creationId xmlns="" xmlns:a16="http://schemas.microsoft.com/office/drawing/2014/main" id="{E3B9DF4B-0C72-4846-9560-CA4C0EF12637}"/>
+                <a16:creationId xmlns:a16="http://schemas.microsoft.com/office/drawing/2014/main" xmlns="" id="{E3B9DF4B-0C72-4846-9560-CA4C0EF12637}"/>
               </a:ext>
             </a:extLst>
           </p:cNvPr>
@@ -202,7 +202,7 @@
           <p:cNvPr id="3" name="Subtítulo 2">
             <a:extLst>
               <a:ext uri="{FF2B5EF4-FFF2-40B4-BE49-F238E27FC236}">
-                <a16:creationId xmlns="" xmlns:a16="http://schemas.microsoft.com/office/drawing/2014/main" id="{685B1628-0B9C-4511-8020-749CB381CA8A}"/>
+                <a16:creationId xmlns:a16="http://schemas.microsoft.com/office/drawing/2014/main" xmlns="" id="{685B1628-0B9C-4511-8020-749CB381CA8A}"/>
               </a:ext>
             </a:extLst>
           </p:cNvPr>
@@ -272,7 +272,7 @@
           <p:cNvPr id="4" name="Marcador de fecha 3">
             <a:extLst>
               <a:ext uri="{FF2B5EF4-FFF2-40B4-BE49-F238E27FC236}">
-                <a16:creationId xmlns="" xmlns:a16="http://schemas.microsoft.com/office/drawing/2014/main" id="{94B80B3E-D487-4AED-BB83-C0CCE4C60C28}"/>
+                <a16:creationId xmlns:a16="http://schemas.microsoft.com/office/drawing/2014/main" xmlns="" id="{94B80B3E-D487-4AED-BB83-C0CCE4C60C28}"/>
               </a:ext>
             </a:extLst>
           </p:cNvPr>
@@ -302,7 +302,7 @@
           <p:cNvPr id="5" name="Marcador de pie de página 4">
             <a:extLst>
               <a:ext uri="{FF2B5EF4-FFF2-40B4-BE49-F238E27FC236}">
-                <a16:creationId xmlns="" xmlns:a16="http://schemas.microsoft.com/office/drawing/2014/main" id="{4C360251-304A-4F05-98C3-0F4C6ACE97D7}"/>
+                <a16:creationId xmlns:a16="http://schemas.microsoft.com/office/drawing/2014/main" xmlns="" id="{4C360251-304A-4F05-98C3-0F4C6ACE97D7}"/>
               </a:ext>
             </a:extLst>
           </p:cNvPr>
@@ -327,7 +327,7 @@
           <p:cNvPr id="6" name="Marcador de número de diapositiva 5">
             <a:extLst>
               <a:ext uri="{FF2B5EF4-FFF2-40B4-BE49-F238E27FC236}">
-                <a16:creationId xmlns="" xmlns:a16="http://schemas.microsoft.com/office/drawing/2014/main" id="{6799EFD0-FF52-4DE6-868B-77F17D2F4FF0}"/>
+                <a16:creationId xmlns:a16="http://schemas.microsoft.com/office/drawing/2014/main" xmlns="" id="{6799EFD0-FF52-4DE6-868B-77F17D2F4FF0}"/>
               </a:ext>
             </a:extLst>
           </p:cNvPr>
@@ -355,7 +355,7 @@
     </p:spTree>
     <p:extLst>
       <p:ext uri="{BB962C8B-B14F-4D97-AF65-F5344CB8AC3E}">
-        <p14:creationId xmlns="" xmlns:p14="http://schemas.microsoft.com/office/powerpoint/2010/main" val="3630569971"/>
+        <p14:creationId xmlns:p14="http://schemas.microsoft.com/office/powerpoint/2010/main" xmlns="" val="3630569971"/>
       </p:ext>
     </p:extLst>
   </p:cSld>
@@ -387,7 +387,7 @@
           <p:cNvPr id="2" name="Título 1">
             <a:extLst>
               <a:ext uri="{FF2B5EF4-FFF2-40B4-BE49-F238E27FC236}">
-                <a16:creationId xmlns="" xmlns:a16="http://schemas.microsoft.com/office/drawing/2014/main" id="{0DC87140-B7D9-4FA4-A34F-FB77A3666A4F}"/>
+                <a16:creationId xmlns:a16="http://schemas.microsoft.com/office/drawing/2014/main" xmlns="" id="{0DC87140-B7D9-4FA4-A34F-FB77A3666A4F}"/>
               </a:ext>
             </a:extLst>
           </p:cNvPr>
@@ -415,7 +415,7 @@
           <p:cNvPr id="3" name="Marcador de texto vertical 2">
             <a:extLst>
               <a:ext uri="{FF2B5EF4-FFF2-40B4-BE49-F238E27FC236}">
-                <a16:creationId xmlns="" xmlns:a16="http://schemas.microsoft.com/office/drawing/2014/main" id="{850563DB-D0F8-4DBB-A77B-19BBDF9BDBCD}"/>
+                <a16:creationId xmlns:a16="http://schemas.microsoft.com/office/drawing/2014/main" xmlns="" id="{850563DB-D0F8-4DBB-A77B-19BBDF9BDBCD}"/>
               </a:ext>
             </a:extLst>
           </p:cNvPr>
@@ -472,7 +472,7 @@
           <p:cNvPr id="4" name="Marcador de fecha 3">
             <a:extLst>
               <a:ext uri="{FF2B5EF4-FFF2-40B4-BE49-F238E27FC236}">
-                <a16:creationId xmlns="" xmlns:a16="http://schemas.microsoft.com/office/drawing/2014/main" id="{F3F66AC4-DE53-4169-9771-B049F319EEA9}"/>
+                <a16:creationId xmlns:a16="http://schemas.microsoft.com/office/drawing/2014/main" xmlns="" id="{F3F66AC4-DE53-4169-9771-B049F319EEA9}"/>
               </a:ext>
             </a:extLst>
           </p:cNvPr>
@@ -502,7 +502,7 @@
           <p:cNvPr id="5" name="Marcador de pie de página 4">
             <a:extLst>
               <a:ext uri="{FF2B5EF4-FFF2-40B4-BE49-F238E27FC236}">
-                <a16:creationId xmlns="" xmlns:a16="http://schemas.microsoft.com/office/drawing/2014/main" id="{7F1B4E51-E6DE-4608-865D-CC9B9B289FC7}"/>
+                <a16:creationId xmlns:a16="http://schemas.microsoft.com/office/drawing/2014/main" xmlns="" id="{7F1B4E51-E6DE-4608-865D-CC9B9B289FC7}"/>
               </a:ext>
             </a:extLst>
           </p:cNvPr>
@@ -527,7 +527,7 @@
           <p:cNvPr id="6" name="Marcador de número de diapositiva 5">
             <a:extLst>
               <a:ext uri="{FF2B5EF4-FFF2-40B4-BE49-F238E27FC236}">
-                <a16:creationId xmlns="" xmlns:a16="http://schemas.microsoft.com/office/drawing/2014/main" id="{AC49A7EA-BD2D-4D11-9E44-7FD8F2848414}"/>
+                <a16:creationId xmlns:a16="http://schemas.microsoft.com/office/drawing/2014/main" xmlns="" id="{AC49A7EA-BD2D-4D11-9E44-7FD8F2848414}"/>
               </a:ext>
             </a:extLst>
           </p:cNvPr>
@@ -555,7 +555,7 @@
     </p:spTree>
     <p:extLst>
       <p:ext uri="{BB962C8B-B14F-4D97-AF65-F5344CB8AC3E}">
-        <p14:creationId xmlns="" xmlns:p14="http://schemas.microsoft.com/office/powerpoint/2010/main" val="3667736171"/>
+        <p14:creationId xmlns:p14="http://schemas.microsoft.com/office/powerpoint/2010/main" xmlns="" val="3667736171"/>
       </p:ext>
     </p:extLst>
   </p:cSld>
@@ -587,7 +587,7 @@
           <p:cNvPr id="2" name="Título vertical 1">
             <a:extLst>
               <a:ext uri="{FF2B5EF4-FFF2-40B4-BE49-F238E27FC236}">
-                <a16:creationId xmlns="" xmlns:a16="http://schemas.microsoft.com/office/drawing/2014/main" id="{5B32CEA0-9850-4637-812E-6A3BA3FDCDE1}"/>
+                <a16:creationId xmlns:a16="http://schemas.microsoft.com/office/drawing/2014/main" xmlns="" id="{5B32CEA0-9850-4637-812E-6A3BA3FDCDE1}"/>
               </a:ext>
             </a:extLst>
           </p:cNvPr>
@@ -620,7 +620,7 @@
           <p:cNvPr id="3" name="Marcador de texto vertical 2">
             <a:extLst>
               <a:ext uri="{FF2B5EF4-FFF2-40B4-BE49-F238E27FC236}">
-                <a16:creationId xmlns="" xmlns:a16="http://schemas.microsoft.com/office/drawing/2014/main" id="{939BC441-ACB3-491E-BDDF-AAB44A6A9480}"/>
+                <a16:creationId xmlns:a16="http://schemas.microsoft.com/office/drawing/2014/main" xmlns="" id="{939BC441-ACB3-491E-BDDF-AAB44A6A9480}"/>
               </a:ext>
             </a:extLst>
           </p:cNvPr>
@@ -682,7 +682,7 @@
           <p:cNvPr id="4" name="Marcador de fecha 3">
             <a:extLst>
               <a:ext uri="{FF2B5EF4-FFF2-40B4-BE49-F238E27FC236}">
-                <a16:creationId xmlns="" xmlns:a16="http://schemas.microsoft.com/office/drawing/2014/main" id="{4E5F3364-5D05-4590-944A-B62A5881200D}"/>
+                <a16:creationId xmlns:a16="http://schemas.microsoft.com/office/drawing/2014/main" xmlns="" id="{4E5F3364-5D05-4590-944A-B62A5881200D}"/>
               </a:ext>
             </a:extLst>
           </p:cNvPr>
@@ -712,7 +712,7 @@
           <p:cNvPr id="5" name="Marcador de pie de página 4">
             <a:extLst>
               <a:ext uri="{FF2B5EF4-FFF2-40B4-BE49-F238E27FC236}">
-                <a16:creationId xmlns="" xmlns:a16="http://schemas.microsoft.com/office/drawing/2014/main" id="{F6634A9D-820F-4C3B-AD07-AAB5383B1C30}"/>
+                <a16:creationId xmlns:a16="http://schemas.microsoft.com/office/drawing/2014/main" xmlns="" id="{F6634A9D-820F-4C3B-AD07-AAB5383B1C30}"/>
               </a:ext>
             </a:extLst>
           </p:cNvPr>
@@ -737,7 +737,7 @@
           <p:cNvPr id="6" name="Marcador de número de diapositiva 5">
             <a:extLst>
               <a:ext uri="{FF2B5EF4-FFF2-40B4-BE49-F238E27FC236}">
-                <a16:creationId xmlns="" xmlns:a16="http://schemas.microsoft.com/office/drawing/2014/main" id="{AF9F029D-3E88-4B7B-BB5B-24C24BC15CA7}"/>
+                <a16:creationId xmlns:a16="http://schemas.microsoft.com/office/drawing/2014/main" xmlns="" id="{AF9F029D-3E88-4B7B-BB5B-24C24BC15CA7}"/>
               </a:ext>
             </a:extLst>
           </p:cNvPr>
@@ -765,7 +765,7 @@
     </p:spTree>
     <p:extLst>
       <p:ext uri="{BB962C8B-B14F-4D97-AF65-F5344CB8AC3E}">
-        <p14:creationId xmlns="" xmlns:p14="http://schemas.microsoft.com/office/powerpoint/2010/main" val="3527137102"/>
+        <p14:creationId xmlns:p14="http://schemas.microsoft.com/office/powerpoint/2010/main" xmlns="" val="3527137102"/>
       </p:ext>
     </p:extLst>
   </p:cSld>
@@ -797,7 +797,7 @@
           <p:cNvPr id="2" name="Título 1">
             <a:extLst>
               <a:ext uri="{FF2B5EF4-FFF2-40B4-BE49-F238E27FC236}">
-                <a16:creationId xmlns="" xmlns:a16="http://schemas.microsoft.com/office/drawing/2014/main" id="{08950D71-BF45-4BBD-819C-49E969998269}"/>
+                <a16:creationId xmlns:a16="http://schemas.microsoft.com/office/drawing/2014/main" xmlns="" id="{08950D71-BF45-4BBD-819C-49E969998269}"/>
               </a:ext>
             </a:extLst>
           </p:cNvPr>
@@ -825,7 +825,7 @@
           <p:cNvPr id="3" name="Marcador de contenido 2">
             <a:extLst>
               <a:ext uri="{FF2B5EF4-FFF2-40B4-BE49-F238E27FC236}">
-                <a16:creationId xmlns="" xmlns:a16="http://schemas.microsoft.com/office/drawing/2014/main" id="{961FBA74-E944-406F-826A-2C37A64FD07F}"/>
+                <a16:creationId xmlns:a16="http://schemas.microsoft.com/office/drawing/2014/main" xmlns="" id="{961FBA74-E944-406F-826A-2C37A64FD07F}"/>
               </a:ext>
             </a:extLst>
           </p:cNvPr>
@@ -882,7 +882,7 @@
           <p:cNvPr id="4" name="Marcador de fecha 3">
             <a:extLst>
               <a:ext uri="{FF2B5EF4-FFF2-40B4-BE49-F238E27FC236}">
-                <a16:creationId xmlns="" xmlns:a16="http://schemas.microsoft.com/office/drawing/2014/main" id="{9BF5C59E-1E2B-45B4-9381-181FD109BDB3}"/>
+                <a16:creationId xmlns:a16="http://schemas.microsoft.com/office/drawing/2014/main" xmlns="" id="{9BF5C59E-1E2B-45B4-9381-181FD109BDB3}"/>
               </a:ext>
             </a:extLst>
           </p:cNvPr>
@@ -912,7 +912,7 @@
           <p:cNvPr id="5" name="Marcador de pie de página 4">
             <a:extLst>
               <a:ext uri="{FF2B5EF4-FFF2-40B4-BE49-F238E27FC236}">
-                <a16:creationId xmlns="" xmlns:a16="http://schemas.microsoft.com/office/drawing/2014/main" id="{A837392A-47E5-47F6-8C55-2267B7EEB618}"/>
+                <a16:creationId xmlns:a16="http://schemas.microsoft.com/office/drawing/2014/main" xmlns="" id="{A837392A-47E5-47F6-8C55-2267B7EEB618}"/>
               </a:ext>
             </a:extLst>
           </p:cNvPr>
@@ -937,7 +937,7 @@
           <p:cNvPr id="6" name="Marcador de número de diapositiva 5">
             <a:extLst>
               <a:ext uri="{FF2B5EF4-FFF2-40B4-BE49-F238E27FC236}">
-                <a16:creationId xmlns="" xmlns:a16="http://schemas.microsoft.com/office/drawing/2014/main" id="{2DAD3A73-252F-438F-9D6E-BFF97E283E0E}"/>
+                <a16:creationId xmlns:a16="http://schemas.microsoft.com/office/drawing/2014/main" xmlns="" id="{2DAD3A73-252F-438F-9D6E-BFF97E283E0E}"/>
               </a:ext>
             </a:extLst>
           </p:cNvPr>
@@ -965,7 +965,7 @@
     </p:spTree>
     <p:extLst>
       <p:ext uri="{BB962C8B-B14F-4D97-AF65-F5344CB8AC3E}">
-        <p14:creationId xmlns="" xmlns:p14="http://schemas.microsoft.com/office/powerpoint/2010/main" val="3101532947"/>
+        <p14:creationId xmlns:p14="http://schemas.microsoft.com/office/powerpoint/2010/main" xmlns="" val="3101532947"/>
       </p:ext>
     </p:extLst>
   </p:cSld>
@@ -997,7 +997,7 @@
           <p:cNvPr id="2" name="Título 1">
             <a:extLst>
               <a:ext uri="{FF2B5EF4-FFF2-40B4-BE49-F238E27FC236}">
-                <a16:creationId xmlns="" xmlns:a16="http://schemas.microsoft.com/office/drawing/2014/main" id="{D95F49E8-9F51-4C29-B594-41EFB07B151D}"/>
+                <a16:creationId xmlns:a16="http://schemas.microsoft.com/office/drawing/2014/main" xmlns="" id="{D95F49E8-9F51-4C29-B594-41EFB07B151D}"/>
               </a:ext>
             </a:extLst>
           </p:cNvPr>
@@ -1034,7 +1034,7 @@
           <p:cNvPr id="3" name="Marcador de texto 2">
             <a:extLst>
               <a:ext uri="{FF2B5EF4-FFF2-40B4-BE49-F238E27FC236}">
-                <a16:creationId xmlns="" xmlns:a16="http://schemas.microsoft.com/office/drawing/2014/main" id="{14212A7B-BB3F-43D7-BB50-5C778BF31233}"/>
+                <a16:creationId xmlns:a16="http://schemas.microsoft.com/office/drawing/2014/main" xmlns="" id="{14212A7B-BB3F-43D7-BB50-5C778BF31233}"/>
               </a:ext>
             </a:extLst>
           </p:cNvPr>
@@ -1159,7 +1159,7 @@
           <p:cNvPr id="4" name="Marcador de fecha 3">
             <a:extLst>
               <a:ext uri="{FF2B5EF4-FFF2-40B4-BE49-F238E27FC236}">
-                <a16:creationId xmlns="" xmlns:a16="http://schemas.microsoft.com/office/drawing/2014/main" id="{4D1F1240-5664-43E2-A8B7-3D42989C6517}"/>
+                <a16:creationId xmlns:a16="http://schemas.microsoft.com/office/drawing/2014/main" xmlns="" id="{4D1F1240-5664-43E2-A8B7-3D42989C6517}"/>
               </a:ext>
             </a:extLst>
           </p:cNvPr>
@@ -1189,7 +1189,7 @@
           <p:cNvPr id="5" name="Marcador de pie de página 4">
             <a:extLst>
               <a:ext uri="{FF2B5EF4-FFF2-40B4-BE49-F238E27FC236}">
-                <a16:creationId xmlns="" xmlns:a16="http://schemas.microsoft.com/office/drawing/2014/main" id="{92038497-9614-49CA-BFAB-997CB1B236C1}"/>
+                <a16:creationId xmlns:a16="http://schemas.microsoft.com/office/drawing/2014/main" xmlns="" id="{92038497-9614-49CA-BFAB-997CB1B236C1}"/>
               </a:ext>
             </a:extLst>
           </p:cNvPr>
@@ -1214,7 +1214,7 @@
           <p:cNvPr id="6" name="Marcador de número de diapositiva 5">
             <a:extLst>
               <a:ext uri="{FF2B5EF4-FFF2-40B4-BE49-F238E27FC236}">
-                <a16:creationId xmlns="" xmlns:a16="http://schemas.microsoft.com/office/drawing/2014/main" id="{833C8CA2-40EC-4045-B0F5-731AF8AEEFD1}"/>
+                <a16:creationId xmlns:a16="http://schemas.microsoft.com/office/drawing/2014/main" xmlns="" id="{833C8CA2-40EC-4045-B0F5-731AF8AEEFD1}"/>
               </a:ext>
             </a:extLst>
           </p:cNvPr>
@@ -1242,7 +1242,7 @@
     </p:spTree>
     <p:extLst>
       <p:ext uri="{BB962C8B-B14F-4D97-AF65-F5344CB8AC3E}">
-        <p14:creationId xmlns="" xmlns:p14="http://schemas.microsoft.com/office/powerpoint/2010/main" val="3711361680"/>
+        <p14:creationId xmlns:p14="http://schemas.microsoft.com/office/powerpoint/2010/main" xmlns="" val="3711361680"/>
       </p:ext>
     </p:extLst>
   </p:cSld>
@@ -1274,7 +1274,7 @@
           <p:cNvPr id="2" name="Título 1">
             <a:extLst>
               <a:ext uri="{FF2B5EF4-FFF2-40B4-BE49-F238E27FC236}">
-                <a16:creationId xmlns="" xmlns:a16="http://schemas.microsoft.com/office/drawing/2014/main" id="{41A6C47D-FD4D-4D43-801F-330700505E61}"/>
+                <a16:creationId xmlns:a16="http://schemas.microsoft.com/office/drawing/2014/main" xmlns="" id="{41A6C47D-FD4D-4D43-801F-330700505E61}"/>
               </a:ext>
             </a:extLst>
           </p:cNvPr>
@@ -1302,7 +1302,7 @@
           <p:cNvPr id="3" name="Marcador de contenido 2">
             <a:extLst>
               <a:ext uri="{FF2B5EF4-FFF2-40B4-BE49-F238E27FC236}">
-                <a16:creationId xmlns="" xmlns:a16="http://schemas.microsoft.com/office/drawing/2014/main" id="{D281C82E-1633-42E6-B5C4-E8BF7CD2F9B4}"/>
+                <a16:creationId xmlns:a16="http://schemas.microsoft.com/office/drawing/2014/main" xmlns="" id="{D281C82E-1633-42E6-B5C4-E8BF7CD2F9B4}"/>
               </a:ext>
             </a:extLst>
           </p:cNvPr>
@@ -1364,7 +1364,7 @@
           <p:cNvPr id="4" name="Marcador de contenido 3">
             <a:extLst>
               <a:ext uri="{FF2B5EF4-FFF2-40B4-BE49-F238E27FC236}">
-                <a16:creationId xmlns="" xmlns:a16="http://schemas.microsoft.com/office/drawing/2014/main" id="{BCA14AFC-7189-41E3-BA37-BCF1815CF68C}"/>
+                <a16:creationId xmlns:a16="http://schemas.microsoft.com/office/drawing/2014/main" xmlns="" id="{BCA14AFC-7189-41E3-BA37-BCF1815CF68C}"/>
               </a:ext>
             </a:extLst>
           </p:cNvPr>
@@ -1426,7 +1426,7 @@
           <p:cNvPr id="5" name="Marcador de fecha 4">
             <a:extLst>
               <a:ext uri="{FF2B5EF4-FFF2-40B4-BE49-F238E27FC236}">
-                <a16:creationId xmlns="" xmlns:a16="http://schemas.microsoft.com/office/drawing/2014/main" id="{C9ABDD57-5E98-4A92-91B4-6445F2830FC3}"/>
+                <a16:creationId xmlns:a16="http://schemas.microsoft.com/office/drawing/2014/main" xmlns="" id="{C9ABDD57-5E98-4A92-91B4-6445F2830FC3}"/>
               </a:ext>
             </a:extLst>
           </p:cNvPr>
@@ -1456,7 +1456,7 @@
           <p:cNvPr id="6" name="Marcador de pie de página 5">
             <a:extLst>
               <a:ext uri="{FF2B5EF4-FFF2-40B4-BE49-F238E27FC236}">
-                <a16:creationId xmlns="" xmlns:a16="http://schemas.microsoft.com/office/drawing/2014/main" id="{8BE8DE0D-8FE7-404D-82FA-81005C035303}"/>
+                <a16:creationId xmlns:a16="http://schemas.microsoft.com/office/drawing/2014/main" xmlns="" id="{8BE8DE0D-8FE7-404D-82FA-81005C035303}"/>
               </a:ext>
             </a:extLst>
           </p:cNvPr>
@@ -1481,7 +1481,7 @@
           <p:cNvPr id="7" name="Marcador de número de diapositiva 6">
             <a:extLst>
               <a:ext uri="{FF2B5EF4-FFF2-40B4-BE49-F238E27FC236}">
-                <a16:creationId xmlns="" xmlns:a16="http://schemas.microsoft.com/office/drawing/2014/main" id="{D89226D1-4424-4713-8FA0-A7E883DDCC6D}"/>
+                <a16:creationId xmlns:a16="http://schemas.microsoft.com/office/drawing/2014/main" xmlns="" id="{D89226D1-4424-4713-8FA0-A7E883DDCC6D}"/>
               </a:ext>
             </a:extLst>
           </p:cNvPr>
@@ -1509,7 +1509,7 @@
     </p:spTree>
     <p:extLst>
       <p:ext uri="{BB962C8B-B14F-4D97-AF65-F5344CB8AC3E}">
-        <p14:creationId xmlns="" xmlns:p14="http://schemas.microsoft.com/office/powerpoint/2010/main" val="2478964046"/>
+        <p14:creationId xmlns:p14="http://schemas.microsoft.com/office/powerpoint/2010/main" xmlns="" val="2478964046"/>
       </p:ext>
     </p:extLst>
   </p:cSld>
@@ -1541,7 +1541,7 @@
           <p:cNvPr id="2" name="Título 1">
             <a:extLst>
               <a:ext uri="{FF2B5EF4-FFF2-40B4-BE49-F238E27FC236}">
-                <a16:creationId xmlns="" xmlns:a16="http://schemas.microsoft.com/office/drawing/2014/main" id="{202F9D12-A55E-498F-94E5-6AA1DDDCC6AA}"/>
+                <a16:creationId xmlns:a16="http://schemas.microsoft.com/office/drawing/2014/main" xmlns="" id="{202F9D12-A55E-498F-94E5-6AA1DDDCC6AA}"/>
               </a:ext>
             </a:extLst>
           </p:cNvPr>
@@ -1574,7 +1574,7 @@
           <p:cNvPr id="3" name="Marcador de texto 2">
             <a:extLst>
               <a:ext uri="{FF2B5EF4-FFF2-40B4-BE49-F238E27FC236}">
-                <a16:creationId xmlns="" xmlns:a16="http://schemas.microsoft.com/office/drawing/2014/main" id="{F45F8F00-0AAE-4BCC-ACE0-EF39A7855793}"/>
+                <a16:creationId xmlns:a16="http://schemas.microsoft.com/office/drawing/2014/main" xmlns="" id="{F45F8F00-0AAE-4BCC-ACE0-EF39A7855793}"/>
               </a:ext>
             </a:extLst>
           </p:cNvPr>
@@ -1645,7 +1645,7 @@
           <p:cNvPr id="4" name="Marcador de contenido 3">
             <a:extLst>
               <a:ext uri="{FF2B5EF4-FFF2-40B4-BE49-F238E27FC236}">
-                <a16:creationId xmlns="" xmlns:a16="http://schemas.microsoft.com/office/drawing/2014/main" id="{480D2540-C401-4457-A666-27A2FE07A1EB}"/>
+                <a16:creationId xmlns:a16="http://schemas.microsoft.com/office/drawing/2014/main" xmlns="" id="{480D2540-C401-4457-A666-27A2FE07A1EB}"/>
               </a:ext>
             </a:extLst>
           </p:cNvPr>
@@ -1707,7 +1707,7 @@
           <p:cNvPr id="5" name="Marcador de texto 4">
             <a:extLst>
               <a:ext uri="{FF2B5EF4-FFF2-40B4-BE49-F238E27FC236}">
-                <a16:creationId xmlns="" xmlns:a16="http://schemas.microsoft.com/office/drawing/2014/main" id="{162F695D-A642-46C8-A831-1B43A3621DC9}"/>
+                <a16:creationId xmlns:a16="http://schemas.microsoft.com/office/drawing/2014/main" xmlns="" id="{162F695D-A642-46C8-A831-1B43A3621DC9}"/>
               </a:ext>
             </a:extLst>
           </p:cNvPr>
@@ -1778,7 +1778,7 @@
           <p:cNvPr id="6" name="Marcador de contenido 5">
             <a:extLst>
               <a:ext uri="{FF2B5EF4-FFF2-40B4-BE49-F238E27FC236}">
-                <a16:creationId xmlns="" xmlns:a16="http://schemas.microsoft.com/office/drawing/2014/main" id="{28899A86-5725-455F-94EE-5587484C3ADA}"/>
+                <a16:creationId xmlns:a16="http://schemas.microsoft.com/office/drawing/2014/main" xmlns="" id="{28899A86-5725-455F-94EE-5587484C3ADA}"/>
               </a:ext>
             </a:extLst>
           </p:cNvPr>
@@ -1840,7 +1840,7 @@
           <p:cNvPr id="7" name="Marcador de fecha 6">
             <a:extLst>
               <a:ext uri="{FF2B5EF4-FFF2-40B4-BE49-F238E27FC236}">
-                <a16:creationId xmlns="" xmlns:a16="http://schemas.microsoft.com/office/drawing/2014/main" id="{71554A8D-DBE0-4421-9267-7776721E8BE7}"/>
+                <a16:creationId xmlns:a16="http://schemas.microsoft.com/office/drawing/2014/main" xmlns="" id="{71554A8D-DBE0-4421-9267-7776721E8BE7}"/>
               </a:ext>
             </a:extLst>
           </p:cNvPr>
@@ -1870,7 +1870,7 @@
           <p:cNvPr id="8" name="Marcador de pie de página 7">
             <a:extLst>
               <a:ext uri="{FF2B5EF4-FFF2-40B4-BE49-F238E27FC236}">
-                <a16:creationId xmlns="" xmlns:a16="http://schemas.microsoft.com/office/drawing/2014/main" id="{71B657D1-4479-4DAA-A27D-75F0872E33AC}"/>
+                <a16:creationId xmlns:a16="http://schemas.microsoft.com/office/drawing/2014/main" xmlns="" id="{71B657D1-4479-4DAA-A27D-75F0872E33AC}"/>
               </a:ext>
             </a:extLst>
           </p:cNvPr>
@@ -1895,7 +1895,7 @@
           <p:cNvPr id="9" name="Marcador de número de diapositiva 8">
             <a:extLst>
               <a:ext uri="{FF2B5EF4-FFF2-40B4-BE49-F238E27FC236}">
-                <a16:creationId xmlns="" xmlns:a16="http://schemas.microsoft.com/office/drawing/2014/main" id="{72E44760-02D4-4C5D-83CF-6712A8290F9D}"/>
+                <a16:creationId xmlns:a16="http://schemas.microsoft.com/office/drawing/2014/main" xmlns="" id="{72E44760-02D4-4C5D-83CF-6712A8290F9D}"/>
               </a:ext>
             </a:extLst>
           </p:cNvPr>
@@ -1923,7 +1923,7 @@
     </p:spTree>
     <p:extLst>
       <p:ext uri="{BB962C8B-B14F-4D97-AF65-F5344CB8AC3E}">
-        <p14:creationId xmlns="" xmlns:p14="http://schemas.microsoft.com/office/powerpoint/2010/main" val="4187433897"/>
+        <p14:creationId xmlns:p14="http://schemas.microsoft.com/office/powerpoint/2010/main" xmlns="" val="4187433897"/>
       </p:ext>
     </p:extLst>
   </p:cSld>
@@ -1955,7 +1955,7 @@
           <p:cNvPr id="2" name="Título 1">
             <a:extLst>
               <a:ext uri="{FF2B5EF4-FFF2-40B4-BE49-F238E27FC236}">
-                <a16:creationId xmlns="" xmlns:a16="http://schemas.microsoft.com/office/drawing/2014/main" id="{6270498C-939A-497C-AF25-022EDE14FDF4}"/>
+                <a16:creationId xmlns:a16="http://schemas.microsoft.com/office/drawing/2014/main" xmlns="" id="{6270498C-939A-497C-AF25-022EDE14FDF4}"/>
               </a:ext>
             </a:extLst>
           </p:cNvPr>
@@ -1983,7 +1983,7 @@
           <p:cNvPr id="3" name="Marcador de fecha 2">
             <a:extLst>
               <a:ext uri="{FF2B5EF4-FFF2-40B4-BE49-F238E27FC236}">
-                <a16:creationId xmlns="" xmlns:a16="http://schemas.microsoft.com/office/drawing/2014/main" id="{38BD6F06-A827-4D38-A1D9-D7BF5373DAD4}"/>
+                <a16:creationId xmlns:a16="http://schemas.microsoft.com/office/drawing/2014/main" xmlns="" id="{38BD6F06-A827-4D38-A1D9-D7BF5373DAD4}"/>
               </a:ext>
             </a:extLst>
           </p:cNvPr>
@@ -2013,7 +2013,7 @@
           <p:cNvPr id="4" name="Marcador de pie de página 3">
             <a:extLst>
               <a:ext uri="{FF2B5EF4-FFF2-40B4-BE49-F238E27FC236}">
-                <a16:creationId xmlns="" xmlns:a16="http://schemas.microsoft.com/office/drawing/2014/main" id="{3F2DAFBA-2A4E-4070-8FD2-B6A0C9CD462C}"/>
+                <a16:creationId xmlns:a16="http://schemas.microsoft.com/office/drawing/2014/main" xmlns="" id="{3F2DAFBA-2A4E-4070-8FD2-B6A0C9CD462C}"/>
               </a:ext>
             </a:extLst>
           </p:cNvPr>
@@ -2038,7 +2038,7 @@
           <p:cNvPr id="5" name="Marcador de número de diapositiva 4">
             <a:extLst>
               <a:ext uri="{FF2B5EF4-FFF2-40B4-BE49-F238E27FC236}">
-                <a16:creationId xmlns="" xmlns:a16="http://schemas.microsoft.com/office/drawing/2014/main" id="{E3299BBA-08D4-4CE8-8C03-024C7A0AB49C}"/>
+                <a16:creationId xmlns:a16="http://schemas.microsoft.com/office/drawing/2014/main" xmlns="" id="{E3299BBA-08D4-4CE8-8C03-024C7A0AB49C}"/>
               </a:ext>
             </a:extLst>
           </p:cNvPr>
@@ -2066,7 +2066,7 @@
     </p:spTree>
     <p:extLst>
       <p:ext uri="{BB962C8B-B14F-4D97-AF65-F5344CB8AC3E}">
-        <p14:creationId xmlns="" xmlns:p14="http://schemas.microsoft.com/office/powerpoint/2010/main" val="1211332172"/>
+        <p14:creationId xmlns:p14="http://schemas.microsoft.com/office/powerpoint/2010/main" xmlns="" val="1211332172"/>
       </p:ext>
     </p:extLst>
   </p:cSld>
@@ -2098,7 +2098,7 @@
           <p:cNvPr id="2" name="Marcador de fecha 1">
             <a:extLst>
               <a:ext uri="{FF2B5EF4-FFF2-40B4-BE49-F238E27FC236}">
-                <a16:creationId xmlns="" xmlns:a16="http://schemas.microsoft.com/office/drawing/2014/main" id="{B2784211-5E54-4766-8B46-12C57FCBC2B6}"/>
+                <a16:creationId xmlns:a16="http://schemas.microsoft.com/office/drawing/2014/main" xmlns="" id="{B2784211-5E54-4766-8B46-12C57FCBC2B6}"/>
               </a:ext>
             </a:extLst>
           </p:cNvPr>
@@ -2128,7 +2128,7 @@
           <p:cNvPr id="3" name="Marcador de pie de página 2">
             <a:extLst>
               <a:ext uri="{FF2B5EF4-FFF2-40B4-BE49-F238E27FC236}">
-                <a16:creationId xmlns="" xmlns:a16="http://schemas.microsoft.com/office/drawing/2014/main" id="{92520B57-CC9A-4071-8120-E857E89EDEB8}"/>
+                <a16:creationId xmlns:a16="http://schemas.microsoft.com/office/drawing/2014/main" xmlns="" id="{92520B57-CC9A-4071-8120-E857E89EDEB8}"/>
               </a:ext>
             </a:extLst>
           </p:cNvPr>
@@ -2153,7 +2153,7 @@
           <p:cNvPr id="4" name="Marcador de número de diapositiva 3">
             <a:extLst>
               <a:ext uri="{FF2B5EF4-FFF2-40B4-BE49-F238E27FC236}">
-                <a16:creationId xmlns="" xmlns:a16="http://schemas.microsoft.com/office/drawing/2014/main" id="{8787466D-3F3F-4F9A-B628-C2FA36CE4FE2}"/>
+                <a16:creationId xmlns:a16="http://schemas.microsoft.com/office/drawing/2014/main" xmlns="" id="{8787466D-3F3F-4F9A-B628-C2FA36CE4FE2}"/>
               </a:ext>
             </a:extLst>
           </p:cNvPr>
@@ -2181,7 +2181,7 @@
     </p:spTree>
     <p:extLst>
       <p:ext uri="{BB962C8B-B14F-4D97-AF65-F5344CB8AC3E}">
-        <p14:creationId xmlns="" xmlns:p14="http://schemas.microsoft.com/office/powerpoint/2010/main" val="2413498818"/>
+        <p14:creationId xmlns:p14="http://schemas.microsoft.com/office/powerpoint/2010/main" xmlns="" val="2413498818"/>
       </p:ext>
     </p:extLst>
   </p:cSld>
@@ -2213,7 +2213,7 @@
           <p:cNvPr id="2" name="Título 1">
             <a:extLst>
               <a:ext uri="{FF2B5EF4-FFF2-40B4-BE49-F238E27FC236}">
-                <a16:creationId xmlns="" xmlns:a16="http://schemas.microsoft.com/office/drawing/2014/main" id="{44E3FDF0-D5CD-4C55-83E1-A554A3F3F591}"/>
+                <a16:creationId xmlns:a16="http://schemas.microsoft.com/office/drawing/2014/main" xmlns="" id="{44E3FDF0-D5CD-4C55-83E1-A554A3F3F591}"/>
               </a:ext>
             </a:extLst>
           </p:cNvPr>
@@ -2250,7 +2250,7 @@
           <p:cNvPr id="3" name="Marcador de contenido 2">
             <a:extLst>
               <a:ext uri="{FF2B5EF4-FFF2-40B4-BE49-F238E27FC236}">
-                <a16:creationId xmlns="" xmlns:a16="http://schemas.microsoft.com/office/drawing/2014/main" id="{69135358-973E-4F29-858A-4C75727043F6}"/>
+                <a16:creationId xmlns:a16="http://schemas.microsoft.com/office/drawing/2014/main" xmlns="" id="{69135358-973E-4F29-858A-4C75727043F6}"/>
               </a:ext>
             </a:extLst>
           </p:cNvPr>
@@ -2340,7 +2340,7 @@
           <p:cNvPr id="4" name="Marcador de texto 3">
             <a:extLst>
               <a:ext uri="{FF2B5EF4-FFF2-40B4-BE49-F238E27FC236}">
-                <a16:creationId xmlns="" xmlns:a16="http://schemas.microsoft.com/office/drawing/2014/main" id="{F1FA2661-0462-4433-90DC-A12960285CEA}"/>
+                <a16:creationId xmlns:a16="http://schemas.microsoft.com/office/drawing/2014/main" xmlns="" id="{F1FA2661-0462-4433-90DC-A12960285CEA}"/>
               </a:ext>
             </a:extLst>
           </p:cNvPr>
@@ -2411,7 +2411,7 @@
           <p:cNvPr id="5" name="Marcador de fecha 4">
             <a:extLst>
               <a:ext uri="{FF2B5EF4-FFF2-40B4-BE49-F238E27FC236}">
-                <a16:creationId xmlns="" xmlns:a16="http://schemas.microsoft.com/office/drawing/2014/main" id="{49AD787B-F459-4052-B553-CF5A494DB782}"/>
+                <a16:creationId xmlns:a16="http://schemas.microsoft.com/office/drawing/2014/main" xmlns="" id="{49AD787B-F459-4052-B553-CF5A494DB782}"/>
               </a:ext>
             </a:extLst>
           </p:cNvPr>
@@ -2441,7 +2441,7 @@
           <p:cNvPr id="6" name="Marcador de pie de página 5">
             <a:extLst>
               <a:ext uri="{FF2B5EF4-FFF2-40B4-BE49-F238E27FC236}">
-                <a16:creationId xmlns="" xmlns:a16="http://schemas.microsoft.com/office/drawing/2014/main" id="{382BE518-0B2A-4A03-AACE-B9DE17D076CB}"/>
+                <a16:creationId xmlns:a16="http://schemas.microsoft.com/office/drawing/2014/main" xmlns="" id="{382BE518-0B2A-4A03-AACE-B9DE17D076CB}"/>
               </a:ext>
             </a:extLst>
           </p:cNvPr>
@@ -2466,7 +2466,7 @@
           <p:cNvPr id="7" name="Marcador de número de diapositiva 6">
             <a:extLst>
               <a:ext uri="{FF2B5EF4-FFF2-40B4-BE49-F238E27FC236}">
-                <a16:creationId xmlns="" xmlns:a16="http://schemas.microsoft.com/office/drawing/2014/main" id="{3A808C19-9692-46CC-B81D-3AB421594BFD}"/>
+                <a16:creationId xmlns:a16="http://schemas.microsoft.com/office/drawing/2014/main" xmlns="" id="{3A808C19-9692-46CC-B81D-3AB421594BFD}"/>
               </a:ext>
             </a:extLst>
           </p:cNvPr>
@@ -2494,7 +2494,7 @@
     </p:spTree>
     <p:extLst>
       <p:ext uri="{BB962C8B-B14F-4D97-AF65-F5344CB8AC3E}">
-        <p14:creationId xmlns="" xmlns:p14="http://schemas.microsoft.com/office/powerpoint/2010/main" val="1899574245"/>
+        <p14:creationId xmlns:p14="http://schemas.microsoft.com/office/powerpoint/2010/main" xmlns="" val="1899574245"/>
       </p:ext>
     </p:extLst>
   </p:cSld>
@@ -2526,7 +2526,7 @@
           <p:cNvPr id="2" name="Título 1">
             <a:extLst>
               <a:ext uri="{FF2B5EF4-FFF2-40B4-BE49-F238E27FC236}">
-                <a16:creationId xmlns="" xmlns:a16="http://schemas.microsoft.com/office/drawing/2014/main" id="{5AD62FD5-B09C-4A87-8537-735604610918}"/>
+                <a16:creationId xmlns:a16="http://schemas.microsoft.com/office/drawing/2014/main" xmlns="" id="{5AD62FD5-B09C-4A87-8537-735604610918}"/>
               </a:ext>
             </a:extLst>
           </p:cNvPr>
@@ -2563,7 +2563,7 @@
           <p:cNvPr id="3" name="Marcador de posición de imagen 2">
             <a:extLst>
               <a:ext uri="{FF2B5EF4-FFF2-40B4-BE49-F238E27FC236}">
-                <a16:creationId xmlns="" xmlns:a16="http://schemas.microsoft.com/office/drawing/2014/main" id="{B3D90944-8F4E-47BC-BD69-8E893730E0D2}"/>
+                <a16:creationId xmlns:a16="http://schemas.microsoft.com/office/drawing/2014/main" xmlns="" id="{B3D90944-8F4E-47BC-BD69-8E893730E0D2}"/>
               </a:ext>
             </a:extLst>
           </p:cNvPr>
@@ -2630,7 +2630,7 @@
           <p:cNvPr id="4" name="Marcador de texto 3">
             <a:extLst>
               <a:ext uri="{FF2B5EF4-FFF2-40B4-BE49-F238E27FC236}">
-                <a16:creationId xmlns="" xmlns:a16="http://schemas.microsoft.com/office/drawing/2014/main" id="{094847E1-7783-460E-A2B7-D41F0DC2755F}"/>
+                <a16:creationId xmlns:a16="http://schemas.microsoft.com/office/drawing/2014/main" xmlns="" id="{094847E1-7783-460E-A2B7-D41F0DC2755F}"/>
               </a:ext>
             </a:extLst>
           </p:cNvPr>
@@ -2701,7 +2701,7 @@
           <p:cNvPr id="5" name="Marcador de fecha 4">
             <a:extLst>
               <a:ext uri="{FF2B5EF4-FFF2-40B4-BE49-F238E27FC236}">
-                <a16:creationId xmlns="" xmlns:a16="http://schemas.microsoft.com/office/drawing/2014/main" id="{28A8DEFC-7F7E-47C5-85E7-E75878DFD550}"/>
+                <a16:creationId xmlns:a16="http://schemas.microsoft.com/office/drawing/2014/main" xmlns="" id="{28A8DEFC-7F7E-47C5-85E7-E75878DFD550}"/>
               </a:ext>
             </a:extLst>
           </p:cNvPr>
@@ -2731,7 +2731,7 @@
           <p:cNvPr id="6" name="Marcador de pie de página 5">
             <a:extLst>
               <a:ext uri="{FF2B5EF4-FFF2-40B4-BE49-F238E27FC236}">
-                <a16:creationId xmlns="" xmlns:a16="http://schemas.microsoft.com/office/drawing/2014/main" id="{6108570B-8B55-4DD4-ADE5-4F45C0073E55}"/>
+                <a16:creationId xmlns:a16="http://schemas.microsoft.com/office/drawing/2014/main" xmlns="" id="{6108570B-8B55-4DD4-ADE5-4F45C0073E55}"/>
               </a:ext>
             </a:extLst>
           </p:cNvPr>
@@ -2756,7 +2756,7 @@
           <p:cNvPr id="7" name="Marcador de número de diapositiva 6">
             <a:extLst>
               <a:ext uri="{FF2B5EF4-FFF2-40B4-BE49-F238E27FC236}">
-                <a16:creationId xmlns="" xmlns:a16="http://schemas.microsoft.com/office/drawing/2014/main" id="{46E94416-1E50-4C95-B4AF-F8B12D885D43}"/>
+                <a16:creationId xmlns:a16="http://schemas.microsoft.com/office/drawing/2014/main" xmlns="" id="{46E94416-1E50-4C95-B4AF-F8B12D885D43}"/>
               </a:ext>
             </a:extLst>
           </p:cNvPr>
@@ -2784,7 +2784,7 @@
     </p:spTree>
     <p:extLst>
       <p:ext uri="{BB962C8B-B14F-4D97-AF65-F5344CB8AC3E}">
-        <p14:creationId xmlns="" xmlns:p14="http://schemas.microsoft.com/office/powerpoint/2010/main" val="1689888809"/>
+        <p14:creationId xmlns:p14="http://schemas.microsoft.com/office/powerpoint/2010/main" xmlns="" val="1689888809"/>
       </p:ext>
     </p:extLst>
   </p:cSld>
@@ -2821,7 +2821,7 @@
           <p:cNvPr id="2" name="Marcador de título 1">
             <a:extLst>
               <a:ext uri="{FF2B5EF4-FFF2-40B4-BE49-F238E27FC236}">
-                <a16:creationId xmlns="" xmlns:a16="http://schemas.microsoft.com/office/drawing/2014/main" id="{1C4EA66B-8008-4E62-B470-D012372D9C54}"/>
+                <a16:creationId xmlns:a16="http://schemas.microsoft.com/office/drawing/2014/main" xmlns="" id="{1C4EA66B-8008-4E62-B470-D012372D9C54}"/>
               </a:ext>
             </a:extLst>
           </p:cNvPr>
@@ -2859,7 +2859,7 @@
           <p:cNvPr id="3" name="Marcador de texto 2">
             <a:extLst>
               <a:ext uri="{FF2B5EF4-FFF2-40B4-BE49-F238E27FC236}">
-                <a16:creationId xmlns="" xmlns:a16="http://schemas.microsoft.com/office/drawing/2014/main" id="{932AAA69-39C0-42B4-B0CB-603BEA360F90}"/>
+                <a16:creationId xmlns:a16="http://schemas.microsoft.com/office/drawing/2014/main" xmlns="" id="{932AAA69-39C0-42B4-B0CB-603BEA360F90}"/>
               </a:ext>
             </a:extLst>
           </p:cNvPr>
@@ -2926,7 +2926,7 @@
           <p:cNvPr id="4" name="Marcador de fecha 3">
             <a:extLst>
               <a:ext uri="{FF2B5EF4-FFF2-40B4-BE49-F238E27FC236}">
-                <a16:creationId xmlns="" xmlns:a16="http://schemas.microsoft.com/office/drawing/2014/main" id="{336B4845-2F33-4E2B-820D-DFDA0715031A}"/>
+                <a16:creationId xmlns:a16="http://schemas.microsoft.com/office/drawing/2014/main" xmlns="" id="{336B4845-2F33-4E2B-820D-DFDA0715031A}"/>
               </a:ext>
             </a:extLst>
           </p:cNvPr>
@@ -2974,7 +2974,7 @@
           <p:cNvPr id="5" name="Marcador de pie de página 4">
             <a:extLst>
               <a:ext uri="{FF2B5EF4-FFF2-40B4-BE49-F238E27FC236}">
-                <a16:creationId xmlns="" xmlns:a16="http://schemas.microsoft.com/office/drawing/2014/main" id="{2377ABD5-FE97-43F4-9196-F24C9B97CADB}"/>
+                <a16:creationId xmlns:a16="http://schemas.microsoft.com/office/drawing/2014/main" xmlns="" id="{2377ABD5-FE97-43F4-9196-F24C9B97CADB}"/>
               </a:ext>
             </a:extLst>
           </p:cNvPr>
@@ -3017,7 +3017,7 @@
           <p:cNvPr id="6" name="Marcador de número de diapositiva 5">
             <a:extLst>
               <a:ext uri="{FF2B5EF4-FFF2-40B4-BE49-F238E27FC236}">
-                <a16:creationId xmlns="" xmlns:a16="http://schemas.microsoft.com/office/drawing/2014/main" id="{A20E76EC-D35B-45EB-B53D-F96C980103A1}"/>
+                <a16:creationId xmlns:a16="http://schemas.microsoft.com/office/drawing/2014/main" xmlns="" id="{A20E76EC-D35B-45EB-B53D-F96C980103A1}"/>
               </a:ext>
             </a:extLst>
           </p:cNvPr>
@@ -3063,7 +3063,7 @@
     </p:spTree>
     <p:extLst>
       <p:ext uri="{BB962C8B-B14F-4D97-AF65-F5344CB8AC3E}">
-        <p14:creationId xmlns="" xmlns:p14="http://schemas.microsoft.com/office/powerpoint/2010/main" val="3258147845"/>
+        <p14:creationId xmlns:p14="http://schemas.microsoft.com/office/powerpoint/2010/main" xmlns="" val="3258147845"/>
       </p:ext>
     </p:extLst>
   </p:cSld>
@@ -4839,7 +4839,7 @@
             <p:cNvPr id="41" name="CuadroTexto 19">
               <a:extLst>
                 <a:ext uri="{FF2B5EF4-FFF2-40B4-BE49-F238E27FC236}">
-                  <a16:creationId xmlns="" xmlns:a16="http://schemas.microsoft.com/office/drawing/2014/main" id="{B81A97C9-B44A-4DCA-962F-3BB6FD3A6362}"/>
+                  <a16:creationId xmlns:a16="http://schemas.microsoft.com/office/drawing/2014/main" xmlns="" id="{B81A97C9-B44A-4DCA-962F-3BB6FD3A6362}"/>
                 </a:ext>
               </a:extLst>
             </p:cNvPr>
@@ -7674,7 +7674,7 @@
           <p:cNvPr id="26" name="CuadroTexto 19">
             <a:extLst>
               <a:ext uri="{FF2B5EF4-FFF2-40B4-BE49-F238E27FC236}">
-                <a16:creationId xmlns="" xmlns:a16="http://schemas.microsoft.com/office/drawing/2014/main" id="{B81A97C9-B44A-4DCA-962F-3BB6FD3A6362}"/>
+                <a16:creationId xmlns:a16="http://schemas.microsoft.com/office/drawing/2014/main" xmlns="" id="{B81A97C9-B44A-4DCA-962F-3BB6FD3A6362}"/>
               </a:ext>
             </a:extLst>
           </p:cNvPr>
@@ -7883,7 +7883,7 @@
           <p:cNvPr id="31" name="CuadroTexto 19">
             <a:extLst>
               <a:ext uri="{FF2B5EF4-FFF2-40B4-BE49-F238E27FC236}">
-                <a16:creationId xmlns="" xmlns:a16="http://schemas.microsoft.com/office/drawing/2014/main" id="{B81A97C9-B44A-4DCA-962F-3BB6FD3A6362}"/>
+                <a16:creationId xmlns:a16="http://schemas.microsoft.com/office/drawing/2014/main" xmlns="" id="{B81A97C9-B44A-4DCA-962F-3BB6FD3A6362}"/>
               </a:ext>
             </a:extLst>
           </p:cNvPr>
@@ -8200,7 +8200,7 @@
           <p:cNvPr id="22" name="CuadroTexto 19">
             <a:extLst>
               <a:ext uri="{FF2B5EF4-FFF2-40B4-BE49-F238E27FC236}">
-                <a16:creationId xmlns="" xmlns:a16="http://schemas.microsoft.com/office/drawing/2014/main" id="{B81A97C9-B44A-4DCA-962F-3BB6FD3A6362}"/>
+                <a16:creationId xmlns:a16="http://schemas.microsoft.com/office/drawing/2014/main" xmlns="" id="{B81A97C9-B44A-4DCA-962F-3BB6FD3A6362}"/>
               </a:ext>
             </a:extLst>
           </p:cNvPr>
@@ -8518,13 +8518,7 @@
               <a:rPr lang="es-ES" sz="2400" smtClean="0">
                 <a:latin typeface="Arial Rounded MT Bold" pitchFamily="34" charset="0"/>
               </a:rPr>
-              <a:t>Sin </a:t>
-            </a:r>
-            <a:r>
-              <a:rPr lang="es-ES" sz="2400" smtClean="0">
-                <a:latin typeface="Arial Rounded MT Bold" pitchFamily="34" charset="0"/>
-              </a:rPr>
-              <a:t>modificar</a:t>
+              <a:t>Sin modificar</a:t>
             </a:r>
             <a:endParaRPr lang="es-ES" sz="2400">
               <a:latin typeface="Arial Rounded MT Bold" pitchFamily="34" charset="0"/>
@@ -8776,7 +8770,7 @@
           <p:cNvPr id="27" name="CuadroTexto 26">
             <a:extLst>
               <a:ext uri="{FF2B5EF4-FFF2-40B4-BE49-F238E27FC236}">
-                <a16:creationId xmlns="" xmlns:a16="http://schemas.microsoft.com/office/drawing/2014/main" id="{91083145-8B20-4DC2-B0C8-80BA773F821D}"/>
+                <a16:creationId xmlns:a16="http://schemas.microsoft.com/office/drawing/2014/main" xmlns="" id="{91083145-8B20-4DC2-B0C8-80BA773F821D}"/>
               </a:ext>
             </a:extLst>
           </p:cNvPr>
@@ -8812,7 +8806,7 @@
           <p:cNvPr id="28" name="CuadroTexto 27">
             <a:extLst>
               <a:ext uri="{FF2B5EF4-FFF2-40B4-BE49-F238E27FC236}">
-                <a16:creationId xmlns="" xmlns:a16="http://schemas.microsoft.com/office/drawing/2014/main" id="{9BC4EDBC-C66C-4D35-B8F6-D0AF6921AE75}"/>
+                <a16:creationId xmlns:a16="http://schemas.microsoft.com/office/drawing/2014/main" xmlns="" id="{9BC4EDBC-C66C-4D35-B8F6-D0AF6921AE75}"/>
               </a:ext>
             </a:extLst>
           </p:cNvPr>
@@ -8848,7 +8842,7 @@
           <p:cNvPr id="33" name="17 Rectángulo redondeado">
             <a:extLst>
               <a:ext uri="{FF2B5EF4-FFF2-40B4-BE49-F238E27FC236}">
-                <a16:creationId xmlns="" xmlns:a16="http://schemas.microsoft.com/office/drawing/2014/main" id="{8F3B96F0-FFCD-4FEA-B461-D7A34C8072F4}"/>
+                <a16:creationId xmlns:a16="http://schemas.microsoft.com/office/drawing/2014/main" xmlns="" id="{8F3B96F0-FFCD-4FEA-B461-D7A34C8072F4}"/>
               </a:ext>
             </a:extLst>
           </p:cNvPr>
@@ -8906,7 +8900,7 @@
           <p:cNvPr id="43" name="29 Rectángulo redondeado">
             <a:extLst>
               <a:ext uri="{FF2B5EF4-FFF2-40B4-BE49-F238E27FC236}">
-                <a16:creationId xmlns="" xmlns:a16="http://schemas.microsoft.com/office/drawing/2014/main" id="{4FAB1564-3349-46FD-B549-B071A89FF9A1}"/>
+                <a16:creationId xmlns:a16="http://schemas.microsoft.com/office/drawing/2014/main" xmlns="" id="{4FAB1564-3349-46FD-B549-B071A89FF9A1}"/>
               </a:ext>
             </a:extLst>
           </p:cNvPr>
@@ -8964,7 +8958,7 @@
           <p:cNvPr id="44" name="24 Rectángulo redondeado">
             <a:extLst>
               <a:ext uri="{FF2B5EF4-FFF2-40B4-BE49-F238E27FC236}">
-                <a16:creationId xmlns="" xmlns:a16="http://schemas.microsoft.com/office/drawing/2014/main" id="{9BC53101-F1E5-4084-8AE2-31419AEFF918}"/>
+                <a16:creationId xmlns:a16="http://schemas.microsoft.com/office/drawing/2014/main" xmlns="" id="{9BC53101-F1E5-4084-8AE2-31419AEFF918}"/>
               </a:ext>
             </a:extLst>
           </p:cNvPr>
@@ -9027,7 +9021,7 @@
           <p:cNvPr id="45" name="Rectángulo: esquinas redondeadas 44">
             <a:extLst>
               <a:ext uri="{FF2B5EF4-FFF2-40B4-BE49-F238E27FC236}">
-                <a16:creationId xmlns="" xmlns:a16="http://schemas.microsoft.com/office/drawing/2014/main" id="{49F1DBF7-AD08-4AFA-85B8-84F292D2C132}"/>
+                <a16:creationId xmlns:a16="http://schemas.microsoft.com/office/drawing/2014/main" xmlns="" id="{49F1DBF7-AD08-4AFA-85B8-84F292D2C132}"/>
               </a:ext>
             </a:extLst>
           </p:cNvPr>
@@ -9097,7 +9091,7 @@
           <p:cNvPr id="46" name="24 Rectángulo redondeado">
             <a:extLst>
               <a:ext uri="{FF2B5EF4-FFF2-40B4-BE49-F238E27FC236}">
-                <a16:creationId xmlns="" xmlns:a16="http://schemas.microsoft.com/office/drawing/2014/main" id="{E8048C8F-65ED-423A-81BB-F9A03CDAD52C}"/>
+                <a16:creationId xmlns:a16="http://schemas.microsoft.com/office/drawing/2014/main" xmlns="" id="{E8048C8F-65ED-423A-81BB-F9A03CDAD52C}"/>
               </a:ext>
             </a:extLst>
           </p:cNvPr>
@@ -9159,7 +9153,7 @@
           <p:cNvPr id="47" name="24 Rectángulo redondeado">
             <a:extLst>
               <a:ext uri="{FF2B5EF4-FFF2-40B4-BE49-F238E27FC236}">
-                <a16:creationId xmlns="" xmlns:a16="http://schemas.microsoft.com/office/drawing/2014/main" id="{F73B65AD-B42B-4069-8B40-0C63F934B343}"/>
+                <a16:creationId xmlns:a16="http://schemas.microsoft.com/office/drawing/2014/main" xmlns="" id="{F73B65AD-B42B-4069-8B40-0C63F934B343}"/>
               </a:ext>
             </a:extLst>
           </p:cNvPr>
@@ -9222,7 +9216,7 @@
           <p:cNvPr id="48" name="Flecha: hacia abajo 47">
             <a:extLst>
               <a:ext uri="{FF2B5EF4-FFF2-40B4-BE49-F238E27FC236}">
-                <a16:creationId xmlns="" xmlns:a16="http://schemas.microsoft.com/office/drawing/2014/main" id="{FC7F44F4-AA5E-44C3-9DE7-E03F50B2B0DD}"/>
+                <a16:creationId xmlns:a16="http://schemas.microsoft.com/office/drawing/2014/main" xmlns="" id="{FC7F44F4-AA5E-44C3-9DE7-E03F50B2B0DD}"/>
               </a:ext>
             </a:extLst>
           </p:cNvPr>
@@ -9268,7 +9262,7 @@
           <p:cNvPr id="49" name="Flecha: hacia abajo 48">
             <a:extLst>
               <a:ext uri="{FF2B5EF4-FFF2-40B4-BE49-F238E27FC236}">
-                <a16:creationId xmlns="" xmlns:a16="http://schemas.microsoft.com/office/drawing/2014/main" id="{1F1FF216-8BC8-4817-98B7-22033CB7DAD9}"/>
+                <a16:creationId xmlns:a16="http://schemas.microsoft.com/office/drawing/2014/main" xmlns="" id="{1F1FF216-8BC8-4817-98B7-22033CB7DAD9}"/>
               </a:ext>
             </a:extLst>
           </p:cNvPr>
@@ -9314,7 +9308,7 @@
           <p:cNvPr id="50" name="Flecha: hacia abajo 49">
             <a:extLst>
               <a:ext uri="{FF2B5EF4-FFF2-40B4-BE49-F238E27FC236}">
-                <a16:creationId xmlns="" xmlns:a16="http://schemas.microsoft.com/office/drawing/2014/main" id="{90AE0CC3-D921-4BC2-BB8D-0E99ECF064A0}"/>
+                <a16:creationId xmlns:a16="http://schemas.microsoft.com/office/drawing/2014/main" xmlns="" id="{90AE0CC3-D921-4BC2-BB8D-0E99ECF064A0}"/>
               </a:ext>
             </a:extLst>
           </p:cNvPr>
@@ -9360,7 +9354,7 @@
           <p:cNvPr id="51" name="Flecha: a la derecha 50">
             <a:extLst>
               <a:ext uri="{FF2B5EF4-FFF2-40B4-BE49-F238E27FC236}">
-                <a16:creationId xmlns="" xmlns:a16="http://schemas.microsoft.com/office/drawing/2014/main" id="{D21169A9-6253-485D-B844-D60196093334}"/>
+                <a16:creationId xmlns:a16="http://schemas.microsoft.com/office/drawing/2014/main" xmlns="" id="{D21169A9-6253-485D-B844-D60196093334}"/>
               </a:ext>
             </a:extLst>
           </p:cNvPr>
@@ -9406,7 +9400,7 @@
           <p:cNvPr id="53" name="124 Conector recto de flecha">
             <a:extLst>
               <a:ext uri="{FF2B5EF4-FFF2-40B4-BE49-F238E27FC236}">
-                <a16:creationId xmlns="" xmlns:a16="http://schemas.microsoft.com/office/drawing/2014/main" id="{CB24B452-0240-42AD-AB50-081BD3CBEEB9}"/>
+                <a16:creationId xmlns:a16="http://schemas.microsoft.com/office/drawing/2014/main" xmlns="" id="{CB24B452-0240-42AD-AB50-081BD3CBEEB9}"/>
               </a:ext>
             </a:extLst>
           </p:cNvPr>
@@ -9450,7 +9444,7 @@
           <p:cNvPr id="54" name="124 Conector recto de flecha">
             <a:extLst>
               <a:ext uri="{FF2B5EF4-FFF2-40B4-BE49-F238E27FC236}">
-                <a16:creationId xmlns="" xmlns:a16="http://schemas.microsoft.com/office/drawing/2014/main" id="{2653F2FF-A340-4E65-AF57-F5B892D2AF3C}"/>
+                <a16:creationId xmlns:a16="http://schemas.microsoft.com/office/drawing/2014/main" xmlns="" id="{2653F2FF-A340-4E65-AF57-F5B892D2AF3C}"/>
               </a:ext>
             </a:extLst>
           </p:cNvPr>
@@ -9494,7 +9488,7 @@
           <p:cNvPr id="58" name="Flecha: a la izquierda y derecha 57">
             <a:extLst>
               <a:ext uri="{FF2B5EF4-FFF2-40B4-BE49-F238E27FC236}">
-                <a16:creationId xmlns="" xmlns:a16="http://schemas.microsoft.com/office/drawing/2014/main" id="{9D5C8EB9-71D8-4351-BB6D-4C80F62C8918}"/>
+                <a16:creationId xmlns:a16="http://schemas.microsoft.com/office/drawing/2014/main" xmlns="" id="{9D5C8EB9-71D8-4351-BB6D-4C80F62C8918}"/>
               </a:ext>
             </a:extLst>
           </p:cNvPr>
@@ -9540,7 +9534,7 @@
           <p:cNvPr id="59" name="CuadroTexto 58">
             <a:extLst>
               <a:ext uri="{FF2B5EF4-FFF2-40B4-BE49-F238E27FC236}">
-                <a16:creationId xmlns="" xmlns:a16="http://schemas.microsoft.com/office/drawing/2014/main" id="{5A1D2FEE-BC7E-4255-A037-95CCA5998751}"/>
+                <a16:creationId xmlns:a16="http://schemas.microsoft.com/office/drawing/2014/main" xmlns="" id="{5A1D2FEE-BC7E-4255-A037-95CCA5998751}"/>
               </a:ext>
             </a:extLst>
           </p:cNvPr>
@@ -9591,7 +9585,7 @@
           <p:cNvPr id="60" name="CuadroTexto 59">
             <a:extLst>
               <a:ext uri="{FF2B5EF4-FFF2-40B4-BE49-F238E27FC236}">
-                <a16:creationId xmlns="" xmlns:a16="http://schemas.microsoft.com/office/drawing/2014/main" id="{118416F3-97C4-4518-8F13-E57BA0098A37}"/>
+                <a16:creationId xmlns:a16="http://schemas.microsoft.com/office/drawing/2014/main" xmlns="" id="{118416F3-97C4-4518-8F13-E57BA0098A37}"/>
               </a:ext>
             </a:extLst>
           </p:cNvPr>
@@ -9642,7 +9636,7 @@
           <p:cNvPr id="61" name="CuadroTexto 60">
             <a:extLst>
               <a:ext uri="{FF2B5EF4-FFF2-40B4-BE49-F238E27FC236}">
-                <a16:creationId xmlns="" xmlns:a16="http://schemas.microsoft.com/office/drawing/2014/main" id="{6E0DFE7D-9BB5-437C-91D8-933A82AAFDE9}"/>
+                <a16:creationId xmlns:a16="http://schemas.microsoft.com/office/drawing/2014/main" xmlns="" id="{6E0DFE7D-9BB5-437C-91D8-933A82AAFDE9}"/>
               </a:ext>
             </a:extLst>
           </p:cNvPr>
@@ -9692,7 +9686,7 @@
           <p:cNvPr id="62" name="CuadroTexto 61">
             <a:extLst>
               <a:ext uri="{FF2B5EF4-FFF2-40B4-BE49-F238E27FC236}">
-                <a16:creationId xmlns="" xmlns:a16="http://schemas.microsoft.com/office/drawing/2014/main" id="{951A2C70-E705-4FA8-903D-F2EB33879676}"/>
+                <a16:creationId xmlns:a16="http://schemas.microsoft.com/office/drawing/2014/main" xmlns="" id="{951A2C70-E705-4FA8-903D-F2EB33879676}"/>
               </a:ext>
             </a:extLst>
           </p:cNvPr>
@@ -9741,7 +9735,7 @@
     </p:spTree>
     <p:extLst>
       <p:ext uri="{BB962C8B-B14F-4D97-AF65-F5344CB8AC3E}">
-        <p14:creationId xmlns="" xmlns:p14="http://schemas.microsoft.com/office/powerpoint/2010/main" val="3578574719"/>
+        <p14:creationId xmlns:p14="http://schemas.microsoft.com/office/powerpoint/2010/main" xmlns="" val="3578574719"/>
       </p:ext>
     </p:extLst>
   </p:cSld>
@@ -9880,7 +9874,7 @@
           <p:cNvPr id="26" name="CuadroTexto 19">
             <a:extLst>
               <a:ext uri="{FF2B5EF4-FFF2-40B4-BE49-F238E27FC236}">
-                <a16:creationId xmlns:a16="http://schemas.microsoft.com/office/drawing/2014/main" xmlns="" id="{B81A97C9-B44A-4DCA-962F-3BB6FD3A6362}"/>
+                <a16:creationId xmlns="" xmlns:a16="http://schemas.microsoft.com/office/drawing/2014/main" id="{B81A97C9-B44A-4DCA-962F-3BB6FD3A6362}"/>
               </a:ext>
             </a:extLst>
           </p:cNvPr>
@@ -9917,7 +9911,7 @@
           <p:cNvPr id="33" name="CuadroTexto 19">
             <a:extLst>
               <a:ext uri="{FF2B5EF4-FFF2-40B4-BE49-F238E27FC236}">
-                <a16:creationId xmlns:a16="http://schemas.microsoft.com/office/drawing/2014/main" xmlns="" id="{B81A97C9-B44A-4DCA-962F-3BB6FD3A6362}"/>
+                <a16:creationId xmlns="" xmlns:a16="http://schemas.microsoft.com/office/drawing/2014/main" id="{B81A97C9-B44A-4DCA-962F-3BB6FD3A6362}"/>
               </a:ext>
             </a:extLst>
           </p:cNvPr>
@@ -9954,7 +9948,7 @@
           <p:cNvPr id="16" name="CuadroTexto 19">
             <a:extLst>
               <a:ext uri="{FF2B5EF4-FFF2-40B4-BE49-F238E27FC236}">
-                <a16:creationId xmlns:a16="http://schemas.microsoft.com/office/drawing/2014/main" xmlns="" id="{B81A97C9-B44A-4DCA-962F-3BB6FD3A6362}"/>
+                <a16:creationId xmlns="" xmlns:a16="http://schemas.microsoft.com/office/drawing/2014/main" id="{B81A97C9-B44A-4DCA-962F-3BB6FD3A6362}"/>
               </a:ext>
             </a:extLst>
           </p:cNvPr>
@@ -10037,7 +10031,7 @@
           <p:cNvPr id="18" name="CuadroTexto 19">
             <a:extLst>
               <a:ext uri="{FF2B5EF4-FFF2-40B4-BE49-F238E27FC236}">
-                <a16:creationId xmlns:a16="http://schemas.microsoft.com/office/drawing/2014/main" xmlns="" id="{B81A97C9-B44A-4DCA-962F-3BB6FD3A6362}"/>
+                <a16:creationId xmlns="" xmlns:a16="http://schemas.microsoft.com/office/drawing/2014/main" id="{B81A97C9-B44A-4DCA-962F-3BB6FD3A6362}"/>
               </a:ext>
             </a:extLst>
           </p:cNvPr>
@@ -10126,7 +10120,7 @@
           <p:cNvPr id="20" name="CuadroTexto 19">
             <a:extLst>
               <a:ext uri="{FF2B5EF4-FFF2-40B4-BE49-F238E27FC236}">
-                <a16:creationId xmlns:a16="http://schemas.microsoft.com/office/drawing/2014/main" xmlns="" id="{B81A97C9-B44A-4DCA-962F-3BB6FD3A6362}"/>
+                <a16:creationId xmlns="" xmlns:a16="http://schemas.microsoft.com/office/drawing/2014/main" id="{B81A97C9-B44A-4DCA-962F-3BB6FD3A6362}"/>
               </a:ext>
             </a:extLst>
           </p:cNvPr>
@@ -10520,7 +10514,7 @@
           <p:cNvPr id="26" name="CuadroTexto 19">
             <a:extLst>
               <a:ext uri="{FF2B5EF4-FFF2-40B4-BE49-F238E27FC236}">
-                <a16:creationId xmlns="" xmlns:a16="http://schemas.microsoft.com/office/drawing/2014/main" id="{B81A97C9-B44A-4DCA-962F-3BB6FD3A6362}"/>
+                <a16:creationId xmlns:a16="http://schemas.microsoft.com/office/drawing/2014/main" xmlns="" id="{B81A97C9-B44A-4DCA-962F-3BB6FD3A6362}"/>
               </a:ext>
             </a:extLst>
           </p:cNvPr>
@@ -10557,7 +10551,7 @@
           <p:cNvPr id="27" name="CuadroTexto 19">
             <a:extLst>
               <a:ext uri="{FF2B5EF4-FFF2-40B4-BE49-F238E27FC236}">
-                <a16:creationId xmlns="" xmlns:a16="http://schemas.microsoft.com/office/drawing/2014/main" id="{B81A97C9-B44A-4DCA-962F-3BB6FD3A6362}"/>
+                <a16:creationId xmlns:a16="http://schemas.microsoft.com/office/drawing/2014/main" xmlns="" id="{B81A97C9-B44A-4DCA-962F-3BB6FD3A6362}"/>
               </a:ext>
             </a:extLst>
           </p:cNvPr>
@@ -10594,7 +10588,7 @@
           <p:cNvPr id="31" name="CuadroTexto 19">
             <a:extLst>
               <a:ext uri="{FF2B5EF4-FFF2-40B4-BE49-F238E27FC236}">
-                <a16:creationId xmlns="" xmlns:a16="http://schemas.microsoft.com/office/drawing/2014/main" id="{B81A97C9-B44A-4DCA-962F-3BB6FD3A6362}"/>
+                <a16:creationId xmlns:a16="http://schemas.microsoft.com/office/drawing/2014/main" xmlns="" id="{B81A97C9-B44A-4DCA-962F-3BB6FD3A6362}"/>
               </a:ext>
             </a:extLst>
           </p:cNvPr>
@@ -10630,7 +10624,7 @@
           <p:cNvPr id="33" name="CuadroTexto 19">
             <a:extLst>
               <a:ext uri="{FF2B5EF4-FFF2-40B4-BE49-F238E27FC236}">
-                <a16:creationId xmlns="" xmlns:a16="http://schemas.microsoft.com/office/drawing/2014/main" id="{B81A97C9-B44A-4DCA-962F-3BB6FD3A6362}"/>
+                <a16:creationId xmlns:a16="http://schemas.microsoft.com/office/drawing/2014/main" xmlns="" id="{B81A97C9-B44A-4DCA-962F-3BB6FD3A6362}"/>
               </a:ext>
             </a:extLst>
           </p:cNvPr>
@@ -10667,7 +10661,7 @@
           <p:cNvPr id="35" name="CuadroTexto 19">
             <a:extLst>
               <a:ext uri="{FF2B5EF4-FFF2-40B4-BE49-F238E27FC236}">
-                <a16:creationId xmlns="" xmlns:a16="http://schemas.microsoft.com/office/drawing/2014/main" id="{B81A97C9-B44A-4DCA-962F-3BB6FD3A6362}"/>
+                <a16:creationId xmlns:a16="http://schemas.microsoft.com/office/drawing/2014/main" xmlns="" id="{B81A97C9-B44A-4DCA-962F-3BB6FD3A6362}"/>
               </a:ext>
             </a:extLst>
           </p:cNvPr>
@@ -11250,7 +11244,7 @@
           <p:cNvPr id="13" name="124 Conector recto de flecha">
             <a:extLst>
               <a:ext uri="{FF2B5EF4-FFF2-40B4-BE49-F238E27FC236}">
-                <a16:creationId xmlns="" xmlns:a16="http://schemas.microsoft.com/office/drawing/2014/main" id="{CB24B452-0240-42AD-AB50-081BD3CBEEB9}"/>
+                <a16:creationId xmlns:a16="http://schemas.microsoft.com/office/drawing/2014/main" xmlns="" id="{CB24B452-0240-42AD-AB50-081BD3CBEEB9}"/>
               </a:ext>
             </a:extLst>
           </p:cNvPr>
@@ -11296,7 +11290,7 @@
           <p:cNvPr id="16" name="124 Conector recto de flecha">
             <a:extLst>
               <a:ext uri="{FF2B5EF4-FFF2-40B4-BE49-F238E27FC236}">
-                <a16:creationId xmlns="" xmlns:a16="http://schemas.microsoft.com/office/drawing/2014/main" id="{CB24B452-0240-42AD-AB50-081BD3CBEEB9}"/>
+                <a16:creationId xmlns:a16="http://schemas.microsoft.com/office/drawing/2014/main" xmlns="" id="{CB24B452-0240-42AD-AB50-081BD3CBEEB9}"/>
               </a:ext>
             </a:extLst>
           </p:cNvPr>
@@ -11342,7 +11336,7 @@
           <p:cNvPr id="17" name="124 Conector recto de flecha">
             <a:extLst>
               <a:ext uri="{FF2B5EF4-FFF2-40B4-BE49-F238E27FC236}">
-                <a16:creationId xmlns="" xmlns:a16="http://schemas.microsoft.com/office/drawing/2014/main" id="{CB24B452-0240-42AD-AB50-081BD3CBEEB9}"/>
+                <a16:creationId xmlns:a16="http://schemas.microsoft.com/office/drawing/2014/main" xmlns="" id="{CB24B452-0240-42AD-AB50-081BD3CBEEB9}"/>
               </a:ext>
             </a:extLst>
           </p:cNvPr>
@@ -11388,7 +11382,7 @@
           <p:cNvPr id="24" name="CuadroTexto 27">
             <a:extLst>
               <a:ext uri="{FF2B5EF4-FFF2-40B4-BE49-F238E27FC236}">
-                <a16:creationId xmlns="" xmlns:a16="http://schemas.microsoft.com/office/drawing/2014/main" id="{9BC4EDBC-C66C-4D35-B8F6-D0AF6921AE75}"/>
+                <a16:creationId xmlns:a16="http://schemas.microsoft.com/office/drawing/2014/main" xmlns="" id="{9BC4EDBC-C66C-4D35-B8F6-D0AF6921AE75}"/>
               </a:ext>
             </a:extLst>
           </p:cNvPr>
@@ -11424,7 +11418,7 @@
           <p:cNvPr id="25" name="CuadroTexto 27">
             <a:extLst>
               <a:ext uri="{FF2B5EF4-FFF2-40B4-BE49-F238E27FC236}">
-                <a16:creationId xmlns="" xmlns:a16="http://schemas.microsoft.com/office/drawing/2014/main" id="{9BC4EDBC-C66C-4D35-B8F6-D0AF6921AE75}"/>
+                <a16:creationId xmlns:a16="http://schemas.microsoft.com/office/drawing/2014/main" xmlns="" id="{9BC4EDBC-C66C-4D35-B8F6-D0AF6921AE75}"/>
               </a:ext>
             </a:extLst>
           </p:cNvPr>
@@ -11460,7 +11454,7 @@
           <p:cNvPr id="26" name="CuadroTexto 27">
             <a:extLst>
               <a:ext uri="{FF2B5EF4-FFF2-40B4-BE49-F238E27FC236}">
-                <a16:creationId xmlns="" xmlns:a16="http://schemas.microsoft.com/office/drawing/2014/main" id="{9BC4EDBC-C66C-4D35-B8F6-D0AF6921AE75}"/>
+                <a16:creationId xmlns:a16="http://schemas.microsoft.com/office/drawing/2014/main" xmlns="" id="{9BC4EDBC-C66C-4D35-B8F6-D0AF6921AE75}"/>
               </a:ext>
             </a:extLst>
           </p:cNvPr>
@@ -11561,7 +11555,7 @@
           <p:cNvPr id="27" name="CuadroTexto 26">
             <a:extLst>
               <a:ext uri="{FF2B5EF4-FFF2-40B4-BE49-F238E27FC236}">
-                <a16:creationId xmlns:a16="http://schemas.microsoft.com/office/drawing/2014/main" xmlns="" id="{91083145-8B20-4DC2-B0C8-80BA773F821D}"/>
+                <a16:creationId xmlns="" xmlns:a16="http://schemas.microsoft.com/office/drawing/2014/main" id="{91083145-8B20-4DC2-B0C8-80BA773F821D}"/>
               </a:ext>
             </a:extLst>
           </p:cNvPr>
@@ -11597,7 +11591,7 @@
           <p:cNvPr id="28" name="CuadroTexto 27">
             <a:extLst>
               <a:ext uri="{FF2B5EF4-FFF2-40B4-BE49-F238E27FC236}">
-                <a16:creationId xmlns:a16="http://schemas.microsoft.com/office/drawing/2014/main" xmlns="" id="{9BC4EDBC-C66C-4D35-B8F6-D0AF6921AE75}"/>
+                <a16:creationId xmlns="" xmlns:a16="http://schemas.microsoft.com/office/drawing/2014/main" id="{9BC4EDBC-C66C-4D35-B8F6-D0AF6921AE75}"/>
               </a:ext>
             </a:extLst>
           </p:cNvPr>
@@ -11633,7 +11627,7 @@
           <p:cNvPr id="33" name="17 Rectángulo redondeado">
             <a:extLst>
               <a:ext uri="{FF2B5EF4-FFF2-40B4-BE49-F238E27FC236}">
-                <a16:creationId xmlns:a16="http://schemas.microsoft.com/office/drawing/2014/main" xmlns="" id="{8F3B96F0-FFCD-4FEA-B461-D7A34C8072F4}"/>
+                <a16:creationId xmlns="" xmlns:a16="http://schemas.microsoft.com/office/drawing/2014/main" id="{8F3B96F0-FFCD-4FEA-B461-D7A34C8072F4}"/>
               </a:ext>
             </a:extLst>
           </p:cNvPr>
@@ -11691,7 +11685,7 @@
           <p:cNvPr id="43" name="29 Rectángulo redondeado">
             <a:extLst>
               <a:ext uri="{FF2B5EF4-FFF2-40B4-BE49-F238E27FC236}">
-                <a16:creationId xmlns:a16="http://schemas.microsoft.com/office/drawing/2014/main" xmlns="" id="{4FAB1564-3349-46FD-B549-B071A89FF9A1}"/>
+                <a16:creationId xmlns="" xmlns:a16="http://schemas.microsoft.com/office/drawing/2014/main" id="{4FAB1564-3349-46FD-B549-B071A89FF9A1}"/>
               </a:ext>
             </a:extLst>
           </p:cNvPr>
@@ -11749,7 +11743,7 @@
           <p:cNvPr id="44" name="24 Rectángulo redondeado">
             <a:extLst>
               <a:ext uri="{FF2B5EF4-FFF2-40B4-BE49-F238E27FC236}">
-                <a16:creationId xmlns:a16="http://schemas.microsoft.com/office/drawing/2014/main" xmlns="" id="{9BC53101-F1E5-4084-8AE2-31419AEFF918}"/>
+                <a16:creationId xmlns="" xmlns:a16="http://schemas.microsoft.com/office/drawing/2014/main" id="{9BC53101-F1E5-4084-8AE2-31419AEFF918}"/>
               </a:ext>
             </a:extLst>
           </p:cNvPr>
@@ -11812,7 +11806,7 @@
           <p:cNvPr id="45" name="Rectángulo: esquinas redondeadas 44">
             <a:extLst>
               <a:ext uri="{FF2B5EF4-FFF2-40B4-BE49-F238E27FC236}">
-                <a16:creationId xmlns:a16="http://schemas.microsoft.com/office/drawing/2014/main" xmlns="" id="{49F1DBF7-AD08-4AFA-85B8-84F292D2C132}"/>
+                <a16:creationId xmlns="" xmlns:a16="http://schemas.microsoft.com/office/drawing/2014/main" id="{49F1DBF7-AD08-4AFA-85B8-84F292D2C132}"/>
               </a:ext>
             </a:extLst>
           </p:cNvPr>
@@ -11867,7 +11861,7 @@
           <p:cNvPr id="46" name="24 Rectángulo redondeado">
             <a:extLst>
               <a:ext uri="{FF2B5EF4-FFF2-40B4-BE49-F238E27FC236}">
-                <a16:creationId xmlns:a16="http://schemas.microsoft.com/office/drawing/2014/main" xmlns="" id="{E8048C8F-65ED-423A-81BB-F9A03CDAD52C}"/>
+                <a16:creationId xmlns="" xmlns:a16="http://schemas.microsoft.com/office/drawing/2014/main" id="{E8048C8F-65ED-423A-81BB-F9A03CDAD52C}"/>
               </a:ext>
             </a:extLst>
           </p:cNvPr>
@@ -11929,7 +11923,7 @@
           <p:cNvPr id="47" name="24 Rectángulo redondeado">
             <a:extLst>
               <a:ext uri="{FF2B5EF4-FFF2-40B4-BE49-F238E27FC236}">
-                <a16:creationId xmlns:a16="http://schemas.microsoft.com/office/drawing/2014/main" xmlns="" id="{F73B65AD-B42B-4069-8B40-0C63F934B343}"/>
+                <a16:creationId xmlns="" xmlns:a16="http://schemas.microsoft.com/office/drawing/2014/main" id="{F73B65AD-B42B-4069-8B40-0C63F934B343}"/>
               </a:ext>
             </a:extLst>
           </p:cNvPr>
@@ -11991,7 +11985,7 @@
           <p:cNvPr id="48" name="Flecha: hacia abajo 47">
             <a:extLst>
               <a:ext uri="{FF2B5EF4-FFF2-40B4-BE49-F238E27FC236}">
-                <a16:creationId xmlns:a16="http://schemas.microsoft.com/office/drawing/2014/main" xmlns="" id="{FC7F44F4-AA5E-44C3-9DE7-E03F50B2B0DD}"/>
+                <a16:creationId xmlns="" xmlns:a16="http://schemas.microsoft.com/office/drawing/2014/main" id="{FC7F44F4-AA5E-44C3-9DE7-E03F50B2B0DD}"/>
               </a:ext>
             </a:extLst>
           </p:cNvPr>
@@ -12037,7 +12031,7 @@
           <p:cNvPr id="49" name="Flecha: hacia abajo 48">
             <a:extLst>
               <a:ext uri="{FF2B5EF4-FFF2-40B4-BE49-F238E27FC236}">
-                <a16:creationId xmlns:a16="http://schemas.microsoft.com/office/drawing/2014/main" xmlns="" id="{1F1FF216-8BC8-4817-98B7-22033CB7DAD9}"/>
+                <a16:creationId xmlns="" xmlns:a16="http://schemas.microsoft.com/office/drawing/2014/main" id="{1F1FF216-8BC8-4817-98B7-22033CB7DAD9}"/>
               </a:ext>
             </a:extLst>
           </p:cNvPr>
@@ -12083,7 +12077,7 @@
           <p:cNvPr id="50" name="Flecha: hacia abajo 49">
             <a:extLst>
               <a:ext uri="{FF2B5EF4-FFF2-40B4-BE49-F238E27FC236}">
-                <a16:creationId xmlns:a16="http://schemas.microsoft.com/office/drawing/2014/main" xmlns="" id="{90AE0CC3-D921-4BC2-BB8D-0E99ECF064A0}"/>
+                <a16:creationId xmlns="" xmlns:a16="http://schemas.microsoft.com/office/drawing/2014/main" id="{90AE0CC3-D921-4BC2-BB8D-0E99ECF064A0}"/>
               </a:ext>
             </a:extLst>
           </p:cNvPr>
@@ -12129,7 +12123,7 @@
           <p:cNvPr id="51" name="Flecha: a la derecha 50">
             <a:extLst>
               <a:ext uri="{FF2B5EF4-FFF2-40B4-BE49-F238E27FC236}">
-                <a16:creationId xmlns:a16="http://schemas.microsoft.com/office/drawing/2014/main" xmlns="" id="{D21169A9-6253-485D-B844-D60196093334}"/>
+                <a16:creationId xmlns="" xmlns:a16="http://schemas.microsoft.com/office/drawing/2014/main" id="{D21169A9-6253-485D-B844-D60196093334}"/>
               </a:ext>
             </a:extLst>
           </p:cNvPr>
@@ -12175,7 +12169,7 @@
           <p:cNvPr id="58" name="Flecha: a la izquierda y derecha 57">
             <a:extLst>
               <a:ext uri="{FF2B5EF4-FFF2-40B4-BE49-F238E27FC236}">
-                <a16:creationId xmlns:a16="http://schemas.microsoft.com/office/drawing/2014/main" xmlns="" id="{9D5C8EB9-71D8-4351-BB6D-4C80F62C8918}"/>
+                <a16:creationId xmlns="" xmlns:a16="http://schemas.microsoft.com/office/drawing/2014/main" id="{9D5C8EB9-71D8-4351-BB6D-4C80F62C8918}"/>
               </a:ext>
             </a:extLst>
           </p:cNvPr>
@@ -12221,7 +12215,7 @@
           <p:cNvPr id="59" name="CuadroTexto 58">
             <a:extLst>
               <a:ext uri="{FF2B5EF4-FFF2-40B4-BE49-F238E27FC236}">
-                <a16:creationId xmlns:a16="http://schemas.microsoft.com/office/drawing/2014/main" xmlns="" id="{5A1D2FEE-BC7E-4255-A037-95CCA5998751}"/>
+                <a16:creationId xmlns="" xmlns:a16="http://schemas.microsoft.com/office/drawing/2014/main" id="{5A1D2FEE-BC7E-4255-A037-95CCA5998751}"/>
               </a:ext>
             </a:extLst>
           </p:cNvPr>
@@ -12271,7 +12265,7 @@
           <p:cNvPr id="60" name="CuadroTexto 59">
             <a:extLst>
               <a:ext uri="{FF2B5EF4-FFF2-40B4-BE49-F238E27FC236}">
-                <a16:creationId xmlns:a16="http://schemas.microsoft.com/office/drawing/2014/main" xmlns="" id="{118416F3-97C4-4518-8F13-E57BA0098A37}"/>
+                <a16:creationId xmlns="" xmlns:a16="http://schemas.microsoft.com/office/drawing/2014/main" id="{118416F3-97C4-4518-8F13-E57BA0098A37}"/>
               </a:ext>
             </a:extLst>
           </p:cNvPr>
@@ -12322,7 +12316,7 @@
           <p:cNvPr id="61" name="CuadroTexto 60">
             <a:extLst>
               <a:ext uri="{FF2B5EF4-FFF2-40B4-BE49-F238E27FC236}">
-                <a16:creationId xmlns:a16="http://schemas.microsoft.com/office/drawing/2014/main" xmlns="" id="{6E0DFE7D-9BB5-437C-91D8-933A82AAFDE9}"/>
+                <a16:creationId xmlns="" xmlns:a16="http://schemas.microsoft.com/office/drawing/2014/main" id="{6E0DFE7D-9BB5-437C-91D8-933A82AAFDE9}"/>
               </a:ext>
             </a:extLst>
           </p:cNvPr>
@@ -12393,7 +12387,7 @@
           <p:cNvPr id="62" name="CuadroTexto 61">
             <a:extLst>
               <a:ext uri="{FF2B5EF4-FFF2-40B4-BE49-F238E27FC236}">
-                <a16:creationId xmlns:a16="http://schemas.microsoft.com/office/drawing/2014/main" xmlns="" id="{951A2C70-E705-4FA8-903D-F2EB33879676}"/>
+                <a16:creationId xmlns="" xmlns:a16="http://schemas.microsoft.com/office/drawing/2014/main" id="{951A2C70-E705-4FA8-903D-F2EB33879676}"/>
               </a:ext>
             </a:extLst>
           </p:cNvPr>
@@ -12458,7 +12452,7 @@
           <p:cNvPr id="26" name="23 Rectángulo redondeado">
             <a:extLst>
               <a:ext uri="{FF2B5EF4-FFF2-40B4-BE49-F238E27FC236}">
-                <a16:creationId xmlns:a16="http://schemas.microsoft.com/office/drawing/2014/main" xmlns="" id="{339722A7-A4C5-42DD-86B0-B19AB0712672}"/>
+                <a16:creationId xmlns="" xmlns:a16="http://schemas.microsoft.com/office/drawing/2014/main" id="{339722A7-A4C5-42DD-86B0-B19AB0712672}"/>
               </a:ext>
             </a:extLst>
           </p:cNvPr>
@@ -12509,7 +12503,15 @@
                   <a:schemeClr val="bg1"/>
                 </a:solidFill>
               </a:rPr>
-              <a:t>Chip Video</a:t>
+              <a:t>Chip </a:t>
+            </a:r>
+            <a:r>
+              <a:rPr lang="es-ES" sz="1400" smtClean="0">
+                <a:solidFill>
+                  <a:schemeClr val="bg1"/>
+                </a:solidFill>
+              </a:rPr>
+              <a:t>gráfico</a:t>
             </a:r>
             <a:endParaRPr lang="es-ES" sz="1400">
               <a:solidFill>
@@ -12524,7 +12526,7 @@
           <p:cNvPr id="29" name="25 Rectángulo redondeado">
             <a:extLst>
               <a:ext uri="{FF2B5EF4-FFF2-40B4-BE49-F238E27FC236}">
-                <a16:creationId xmlns:a16="http://schemas.microsoft.com/office/drawing/2014/main" xmlns="" id="{2EFE8F61-F52C-4394-892E-E8E1A8A71E80}"/>
+                <a16:creationId xmlns="" xmlns:a16="http://schemas.microsoft.com/office/drawing/2014/main" id="{2EFE8F61-F52C-4394-892E-E8E1A8A71E80}"/>
               </a:ext>
             </a:extLst>
           </p:cNvPr>
@@ -12575,7 +12577,15 @@
                   <a:schemeClr val="bg1"/>
                 </a:solidFill>
               </a:rPr>
-              <a:t>Chip Sonido</a:t>
+              <a:t>Chip </a:t>
+            </a:r>
+            <a:r>
+              <a:rPr lang="es-ES" sz="1400" smtClean="0">
+                <a:solidFill>
+                  <a:schemeClr val="bg1"/>
+                </a:solidFill>
+              </a:rPr>
+              <a:t>sonido</a:t>
             </a:r>
             <a:endParaRPr lang="es-ES" sz="1400">
               <a:solidFill>
@@ -12590,7 +12600,7 @@
           <p:cNvPr id="30" name="27 Rectángulo redondeado">
             <a:extLst>
               <a:ext uri="{FF2B5EF4-FFF2-40B4-BE49-F238E27FC236}">
-                <a16:creationId xmlns:a16="http://schemas.microsoft.com/office/drawing/2014/main" xmlns="" id="{F807FDB9-C246-4CDB-8FD6-D4A4C68F022E}"/>
+                <a16:creationId xmlns="" xmlns:a16="http://schemas.microsoft.com/office/drawing/2014/main" id="{F807FDB9-C246-4CDB-8FD6-D4A4C68F022E}"/>
               </a:ext>
             </a:extLst>
           </p:cNvPr>
@@ -12651,7 +12661,7 @@
           <p:cNvPr id="36" name="6 Rectángulo redondeado">
             <a:extLst>
               <a:ext uri="{FF2B5EF4-FFF2-40B4-BE49-F238E27FC236}">
-                <a16:creationId xmlns:a16="http://schemas.microsoft.com/office/drawing/2014/main" xmlns="" id="{5AED2532-F822-470C-B2D7-1C691A111771}"/>
+                <a16:creationId xmlns="" xmlns:a16="http://schemas.microsoft.com/office/drawing/2014/main" id="{5AED2532-F822-470C-B2D7-1C691A111771}"/>
               </a:ext>
             </a:extLst>
           </p:cNvPr>
@@ -12714,7 +12724,7 @@
           <p:cNvPr id="38" name="23 Rectángulo redondeado">
             <a:extLst>
               <a:ext uri="{FF2B5EF4-FFF2-40B4-BE49-F238E27FC236}">
-                <a16:creationId xmlns:a16="http://schemas.microsoft.com/office/drawing/2014/main" xmlns="" id="{187143E1-E0A3-4016-8474-CD5193857D0B}"/>
+                <a16:creationId xmlns="" xmlns:a16="http://schemas.microsoft.com/office/drawing/2014/main" id="{187143E1-E0A3-4016-8474-CD5193857D0B}"/>
               </a:ext>
             </a:extLst>
           </p:cNvPr>
@@ -12776,7 +12786,7 @@
                   <a:schemeClr val="bg1"/>
                 </a:solidFill>
               </a:rPr>
-              <a:t>Mandos</a:t>
+              <a:t>mandos</a:t>
             </a:r>
             <a:endParaRPr lang="es-ES" sz="1400">
               <a:solidFill>
@@ -12791,7 +12801,7 @@
           <p:cNvPr id="39" name="23 Rectángulo redondeado">
             <a:extLst>
               <a:ext uri="{FF2B5EF4-FFF2-40B4-BE49-F238E27FC236}">
-                <a16:creationId xmlns:a16="http://schemas.microsoft.com/office/drawing/2014/main" xmlns="" id="{300AE459-67F1-4F96-8E6C-13AC2B423A36}"/>
+                <a16:creationId xmlns="" xmlns:a16="http://schemas.microsoft.com/office/drawing/2014/main" id="{300AE459-67F1-4F96-8E6C-13AC2B423A36}"/>
               </a:ext>
             </a:extLst>
           </p:cNvPr>
@@ -12858,15 +12868,7 @@
                   <a:schemeClr val="bg1"/>
                 </a:solidFill>
               </a:rPr>
-              <a:t>Memory </a:t>
-            </a:r>
-            <a:r>
-              <a:rPr lang="es-ES" sz="1200">
-                <a:solidFill>
-                  <a:schemeClr val="bg1"/>
-                </a:solidFill>
-              </a:rPr>
-              <a:t>card </a:t>
+              <a:t>tarjeta mem.</a:t>
             </a:r>
             <a:endParaRPr lang="es-ES" sz="1400">
               <a:solidFill>
@@ -12881,7 +12883,7 @@
           <p:cNvPr id="52" name="57 Rectángulo redondeado">
             <a:extLst>
               <a:ext uri="{FF2B5EF4-FFF2-40B4-BE49-F238E27FC236}">
-                <a16:creationId xmlns:a16="http://schemas.microsoft.com/office/drawing/2014/main" xmlns="" id="{8E08F4C7-53EF-4F2F-B946-F37593AC1F26}"/>
+                <a16:creationId xmlns="" xmlns:a16="http://schemas.microsoft.com/office/drawing/2014/main" id="{8E08F4C7-53EF-4F2F-B946-F37593AC1F26}"/>
               </a:ext>
             </a:extLst>
           </p:cNvPr>
@@ -12958,7 +12960,7 @@
           <p:cNvPr id="55" name="6 Rectángulo redondeado">
             <a:extLst>
               <a:ext uri="{FF2B5EF4-FFF2-40B4-BE49-F238E27FC236}">
-                <a16:creationId xmlns:a16="http://schemas.microsoft.com/office/drawing/2014/main" xmlns="" id="{ACCA5843-AEE3-47F1-B2C3-789C23ACED5F}"/>
+                <a16:creationId xmlns="" xmlns:a16="http://schemas.microsoft.com/office/drawing/2014/main" id="{ACCA5843-AEE3-47F1-B2C3-789C23ACED5F}"/>
               </a:ext>
             </a:extLst>
           </p:cNvPr>
@@ -13020,7 +13022,7 @@
           <p:cNvPr id="56" name="27 Rectángulo redondeado">
             <a:extLst>
               <a:ext uri="{FF2B5EF4-FFF2-40B4-BE49-F238E27FC236}">
-                <a16:creationId xmlns:a16="http://schemas.microsoft.com/office/drawing/2014/main" xmlns="" id="{6DB621EB-C72A-4585-86DD-509F9BB19740}"/>
+                <a16:creationId xmlns="" xmlns:a16="http://schemas.microsoft.com/office/drawing/2014/main" id="{6DB621EB-C72A-4585-86DD-509F9BB19740}"/>
               </a:ext>
             </a:extLst>
           </p:cNvPr>
@@ -13066,13 +13068,18 @@
           <a:p>
             <a:pPr algn="ctr"/>
             <a:r>
-              <a:rPr lang="es-ES" sz="1400">
+              <a:rPr lang="es-ES" sz="1300" smtClean="0">
                 <a:solidFill>
                   <a:schemeClr val="bg1"/>
                 </a:solidFill>
               </a:rPr>
-              <a:t>Timer</a:t>
-            </a:r>
+              <a:t>Tempori-zador</a:t>
+            </a:r>
+            <a:endParaRPr lang="es-ES" sz="1300">
+              <a:solidFill>
+                <a:schemeClr val="bg1"/>
+              </a:solidFill>
+            </a:endParaRPr>
           </a:p>
         </p:txBody>
       </p:sp>
@@ -13081,7 +13088,7 @@
           <p:cNvPr id="57" name="23 Rectángulo redondeado">
             <a:extLst>
               <a:ext uri="{FF2B5EF4-FFF2-40B4-BE49-F238E27FC236}">
-                <a16:creationId xmlns:a16="http://schemas.microsoft.com/office/drawing/2014/main" xmlns="" id="{286A1C29-2828-4310-B820-886797DB12A3}"/>
+                <a16:creationId xmlns="" xmlns:a16="http://schemas.microsoft.com/office/drawing/2014/main" id="{286A1C29-2828-4310-B820-886797DB12A3}"/>
               </a:ext>
             </a:extLst>
           </p:cNvPr>
@@ -13155,7 +13162,7 @@
           <p:cNvPr id="32" name="Rectángulo: esquinas redondeadas 31">
             <a:extLst>
               <a:ext uri="{FF2B5EF4-FFF2-40B4-BE49-F238E27FC236}">
-                <a16:creationId xmlns:a16="http://schemas.microsoft.com/office/drawing/2014/main" xmlns="" id="{D79842A1-BDC5-4268-9F41-9A1D6D23C720}"/>
+                <a16:creationId xmlns="" xmlns:a16="http://schemas.microsoft.com/office/drawing/2014/main" id="{D79842A1-BDC5-4268-9F41-9A1D6D23C720}"/>
               </a:ext>
             </a:extLst>
           </p:cNvPr>
@@ -13277,7 +13284,7 @@
           <p:cNvPr id="54" name="124 Conector recto de flecha">
             <a:extLst>
               <a:ext uri="{FF2B5EF4-FFF2-40B4-BE49-F238E27FC236}">
-                <a16:creationId xmlns:a16="http://schemas.microsoft.com/office/drawing/2014/main" xmlns="" id="{2653F2FF-A340-4E65-AF57-F5B892D2AF3C}"/>
+                <a16:creationId xmlns="" xmlns:a16="http://schemas.microsoft.com/office/drawing/2014/main" id="{2653F2FF-A340-4E65-AF57-F5B892D2AF3C}"/>
               </a:ext>
             </a:extLst>
           </p:cNvPr>
@@ -13321,7 +13328,7 @@
           <p:cNvPr id="41" name="124 Conector recto de flecha">
             <a:extLst>
               <a:ext uri="{FF2B5EF4-FFF2-40B4-BE49-F238E27FC236}">
-                <a16:creationId xmlns:a16="http://schemas.microsoft.com/office/drawing/2014/main" xmlns="" id="{62513997-4E73-4BFB-8EF8-59B7DA5B99DE}"/>
+                <a16:creationId xmlns="" xmlns:a16="http://schemas.microsoft.com/office/drawing/2014/main" id="{62513997-4E73-4BFB-8EF8-59B7DA5B99DE}"/>
               </a:ext>
             </a:extLst>
           </p:cNvPr>
@@ -13363,7 +13370,7 @@
     </p:spTree>
     <p:extLst>
       <p:ext uri="{BB962C8B-B14F-4D97-AF65-F5344CB8AC3E}">
-        <p14:creationId xmlns:p14="http://schemas.microsoft.com/office/powerpoint/2010/main" xmlns="" val="890748881"/>
+        <p14:creationId xmlns="" xmlns:p14="http://schemas.microsoft.com/office/powerpoint/2010/main" val="890748881"/>
       </p:ext>
     </p:extLst>
   </p:cSld>
@@ -13415,7 +13422,7 @@
           <p:cNvPr id="30" name="27 Rectángulo redondeado">
             <a:extLst>
               <a:ext uri="{FF2B5EF4-FFF2-40B4-BE49-F238E27FC236}">
-                <a16:creationId xmlns="" xmlns:a16="http://schemas.microsoft.com/office/drawing/2014/main" id="{F807FDB9-C246-4CDB-8FD6-D4A4C68F022E}"/>
+                <a16:creationId xmlns:a16="http://schemas.microsoft.com/office/drawing/2014/main" xmlns="" id="{F807FDB9-C246-4CDB-8FD6-D4A4C68F022E}"/>
               </a:ext>
             </a:extLst>
           </p:cNvPr>
@@ -13476,7 +13483,7 @@
           <p:cNvPr id="39" name="23 Rectángulo redondeado">
             <a:extLst>
               <a:ext uri="{FF2B5EF4-FFF2-40B4-BE49-F238E27FC236}">
-                <a16:creationId xmlns="" xmlns:a16="http://schemas.microsoft.com/office/drawing/2014/main" id="{300AE459-67F1-4F96-8E6C-13AC2B423A36}"/>
+                <a16:creationId xmlns:a16="http://schemas.microsoft.com/office/drawing/2014/main" xmlns="" id="{300AE459-67F1-4F96-8E6C-13AC2B423A36}"/>
               </a:ext>
             </a:extLst>
           </p:cNvPr>
@@ -13542,7 +13549,7 @@
           <p:cNvPr id="57" name="23 Rectángulo redondeado">
             <a:extLst>
               <a:ext uri="{FF2B5EF4-FFF2-40B4-BE49-F238E27FC236}">
-                <a16:creationId xmlns="" xmlns:a16="http://schemas.microsoft.com/office/drawing/2014/main" id="{286A1C29-2828-4310-B820-886797DB12A3}"/>
+                <a16:creationId xmlns:a16="http://schemas.microsoft.com/office/drawing/2014/main" xmlns="" id="{286A1C29-2828-4310-B820-886797DB12A3}"/>
               </a:ext>
             </a:extLst>
           </p:cNvPr>
@@ -13624,7 +13631,7 @@
           <p:cNvPr id="64" name="CuadroTexto 26">
             <a:extLst>
               <a:ext uri="{FF2B5EF4-FFF2-40B4-BE49-F238E27FC236}">
-                <a16:creationId xmlns="" xmlns:a16="http://schemas.microsoft.com/office/drawing/2014/main" id="{91083145-8B20-4DC2-B0C8-80BA773F821D}"/>
+                <a16:creationId xmlns:a16="http://schemas.microsoft.com/office/drawing/2014/main" xmlns="" id="{91083145-8B20-4DC2-B0C8-80BA773F821D}"/>
               </a:ext>
             </a:extLst>
           </p:cNvPr>
@@ -13661,7 +13668,7 @@
           <p:cNvPr id="65" name="CuadroTexto 27">
             <a:extLst>
               <a:ext uri="{FF2B5EF4-FFF2-40B4-BE49-F238E27FC236}">
-                <a16:creationId xmlns="" xmlns:a16="http://schemas.microsoft.com/office/drawing/2014/main" id="{9BC4EDBC-C66C-4D35-B8F6-D0AF6921AE75}"/>
+                <a16:creationId xmlns:a16="http://schemas.microsoft.com/office/drawing/2014/main" xmlns="" id="{9BC4EDBC-C66C-4D35-B8F6-D0AF6921AE75}"/>
               </a:ext>
             </a:extLst>
           </p:cNvPr>
@@ -13698,7 +13705,7 @@
           <p:cNvPr id="66" name="124 Conector recto de flecha">
             <a:extLst>
               <a:ext uri="{FF2B5EF4-FFF2-40B4-BE49-F238E27FC236}">
-                <a16:creationId xmlns="" xmlns:a16="http://schemas.microsoft.com/office/drawing/2014/main" id="{CB24B452-0240-42AD-AB50-081BD3CBEEB9}"/>
+                <a16:creationId xmlns:a16="http://schemas.microsoft.com/office/drawing/2014/main" xmlns="" id="{CB24B452-0240-42AD-AB50-081BD3CBEEB9}"/>
               </a:ext>
             </a:extLst>
           </p:cNvPr>
@@ -13742,7 +13749,7 @@
           <p:cNvPr id="68" name="124 Conector recto de flecha">
             <a:extLst>
               <a:ext uri="{FF2B5EF4-FFF2-40B4-BE49-F238E27FC236}">
-                <a16:creationId xmlns="" xmlns:a16="http://schemas.microsoft.com/office/drawing/2014/main" id="{CB24B452-0240-42AD-AB50-081BD3CBEEB9}"/>
+                <a16:creationId xmlns:a16="http://schemas.microsoft.com/office/drawing/2014/main" xmlns="" id="{CB24B452-0240-42AD-AB50-081BD3CBEEB9}"/>
               </a:ext>
             </a:extLst>
           </p:cNvPr>
@@ -13828,11 +13835,7 @@
             <a:pPr algn="ctr"/>
             <a:r>
               <a:rPr lang="es-ES" sz="2400" smtClean="0"/>
-              <a:t>Bus de m</a:t>
-            </a:r>
-            <a:r>
-              <a:rPr lang="es-ES" sz="2400" smtClean="0"/>
-              <a:t>emoria  </a:t>
+              <a:t>Bus de memoria  </a:t>
             </a:r>
             <a:r>
               <a:rPr lang="es-ES" sz="2000" smtClean="0">
@@ -13995,7 +13998,7 @@
           <p:cNvPr id="22" name="6 Rectángulo redondeado">
             <a:extLst>
               <a:ext uri="{FF2B5EF4-FFF2-40B4-BE49-F238E27FC236}">
-                <a16:creationId xmlns="" xmlns:a16="http://schemas.microsoft.com/office/drawing/2014/main" id="{5AED2532-F822-470C-B2D7-1C691A111771}"/>
+                <a16:creationId xmlns:a16="http://schemas.microsoft.com/office/drawing/2014/main" xmlns="" id="{5AED2532-F822-470C-B2D7-1C691A111771}"/>
               </a:ext>
             </a:extLst>
           </p:cNvPr>
@@ -14058,7 +14061,7 @@
           <p:cNvPr id="23" name="6 Rectángulo redondeado">
             <a:extLst>
               <a:ext uri="{FF2B5EF4-FFF2-40B4-BE49-F238E27FC236}">
-                <a16:creationId xmlns="" xmlns:a16="http://schemas.microsoft.com/office/drawing/2014/main" id="{ACCA5843-AEE3-47F1-B2C3-789C23ACED5F}"/>
+                <a16:creationId xmlns:a16="http://schemas.microsoft.com/office/drawing/2014/main" xmlns="" id="{ACCA5843-AEE3-47F1-B2C3-789C23ACED5F}"/>
               </a:ext>
             </a:extLst>
           </p:cNvPr>
@@ -14118,7 +14121,7 @@
     </p:spTree>
     <p:extLst>
       <p:ext uri="{BB962C8B-B14F-4D97-AF65-F5344CB8AC3E}">
-        <p14:creationId xmlns="" xmlns:p14="http://schemas.microsoft.com/office/powerpoint/2010/main" val="890748881"/>
+        <p14:creationId xmlns:p14="http://schemas.microsoft.com/office/powerpoint/2010/main" xmlns="" val="890748881"/>
       </p:ext>
     </p:extLst>
   </p:cSld>
@@ -14161,7 +14164,7 @@
           <p:cNvPr id="26" name="23 Rectángulo redondeado">
             <a:extLst>
               <a:ext uri="{FF2B5EF4-FFF2-40B4-BE49-F238E27FC236}">
-                <a16:creationId xmlns="" xmlns:a16="http://schemas.microsoft.com/office/drawing/2014/main" id="{339722A7-A4C5-42DD-86B0-B19AB0712672}"/>
+                <a16:creationId xmlns:a16="http://schemas.microsoft.com/office/drawing/2014/main" xmlns="" id="{339722A7-A4C5-42DD-86B0-B19AB0712672}"/>
               </a:ext>
             </a:extLst>
           </p:cNvPr>
@@ -14212,15 +14215,7 @@
                   <a:schemeClr val="bg1"/>
                 </a:solidFill>
               </a:rPr>
-              <a:t>Chip g</a:t>
-            </a:r>
-            <a:r>
-              <a:rPr lang="es-ES" sz="1400" smtClean="0">
-                <a:solidFill>
-                  <a:schemeClr val="bg1"/>
-                </a:solidFill>
-              </a:rPr>
-              <a:t>ráfico</a:t>
+              <a:t>Chip gráfico</a:t>
             </a:r>
             <a:endParaRPr lang="es-ES" sz="1400">
               <a:solidFill>
@@ -14235,7 +14230,7 @@
           <p:cNvPr id="29" name="25 Rectángulo redondeado">
             <a:extLst>
               <a:ext uri="{FF2B5EF4-FFF2-40B4-BE49-F238E27FC236}">
-                <a16:creationId xmlns="" xmlns:a16="http://schemas.microsoft.com/office/drawing/2014/main" id="{2EFE8F61-F52C-4394-892E-E8E1A8A71E80}"/>
+                <a16:creationId xmlns:a16="http://schemas.microsoft.com/office/drawing/2014/main" xmlns="" id="{2EFE8F61-F52C-4394-892E-E8E1A8A71E80}"/>
               </a:ext>
             </a:extLst>
           </p:cNvPr>
@@ -14301,7 +14296,7 @@
           <p:cNvPr id="30" name="27 Rectángulo redondeado">
             <a:extLst>
               <a:ext uri="{FF2B5EF4-FFF2-40B4-BE49-F238E27FC236}">
-                <a16:creationId xmlns="" xmlns:a16="http://schemas.microsoft.com/office/drawing/2014/main" id="{F807FDB9-C246-4CDB-8FD6-D4A4C68F022E}"/>
+                <a16:creationId xmlns:a16="http://schemas.microsoft.com/office/drawing/2014/main" xmlns="" id="{F807FDB9-C246-4CDB-8FD6-D4A4C68F022E}"/>
               </a:ext>
             </a:extLst>
           </p:cNvPr>
@@ -14362,7 +14357,7 @@
           <p:cNvPr id="38" name="23 Rectángulo redondeado">
             <a:extLst>
               <a:ext uri="{FF2B5EF4-FFF2-40B4-BE49-F238E27FC236}">
-                <a16:creationId xmlns="" xmlns:a16="http://schemas.microsoft.com/office/drawing/2014/main" id="{187143E1-E0A3-4016-8474-CD5193857D0B}"/>
+                <a16:creationId xmlns:a16="http://schemas.microsoft.com/office/drawing/2014/main" xmlns="" id="{187143E1-E0A3-4016-8474-CD5193857D0B}"/>
               </a:ext>
             </a:extLst>
           </p:cNvPr>
@@ -14436,7 +14431,7 @@
           <p:cNvPr id="39" name="23 Rectángulo redondeado">
             <a:extLst>
               <a:ext uri="{FF2B5EF4-FFF2-40B4-BE49-F238E27FC236}">
-                <a16:creationId xmlns="" xmlns:a16="http://schemas.microsoft.com/office/drawing/2014/main" id="{300AE459-67F1-4F96-8E6C-13AC2B423A36}"/>
+                <a16:creationId xmlns:a16="http://schemas.microsoft.com/office/drawing/2014/main" xmlns="" id="{300AE459-67F1-4F96-8E6C-13AC2B423A36}"/>
               </a:ext>
             </a:extLst>
           </p:cNvPr>
@@ -14502,7 +14497,7 @@
           <p:cNvPr id="52" name="57 Rectángulo redondeado">
             <a:extLst>
               <a:ext uri="{FF2B5EF4-FFF2-40B4-BE49-F238E27FC236}">
-                <a16:creationId xmlns="" xmlns:a16="http://schemas.microsoft.com/office/drawing/2014/main" id="{8E08F4C7-53EF-4F2F-B946-F37593AC1F26}"/>
+                <a16:creationId xmlns:a16="http://schemas.microsoft.com/office/drawing/2014/main" xmlns="" id="{8E08F4C7-53EF-4F2F-B946-F37593AC1F26}"/>
               </a:ext>
             </a:extLst>
           </p:cNvPr>
@@ -14579,7 +14574,7 @@
           <p:cNvPr id="56" name="27 Rectángulo redondeado">
             <a:extLst>
               <a:ext uri="{FF2B5EF4-FFF2-40B4-BE49-F238E27FC236}">
-                <a16:creationId xmlns="" xmlns:a16="http://schemas.microsoft.com/office/drawing/2014/main" id="{6DB621EB-C72A-4585-86DD-509F9BB19740}"/>
+                <a16:creationId xmlns:a16="http://schemas.microsoft.com/office/drawing/2014/main" xmlns="" id="{6DB621EB-C72A-4585-86DD-509F9BB19740}"/>
               </a:ext>
             </a:extLst>
           </p:cNvPr>
@@ -14656,7 +14651,7 @@
           <p:cNvPr id="57" name="23 Rectángulo redondeado">
             <a:extLst>
               <a:ext uri="{FF2B5EF4-FFF2-40B4-BE49-F238E27FC236}">
-                <a16:creationId xmlns="" xmlns:a16="http://schemas.microsoft.com/office/drawing/2014/main" id="{286A1C29-2828-4310-B820-886797DB12A3}"/>
+                <a16:creationId xmlns:a16="http://schemas.microsoft.com/office/drawing/2014/main" xmlns="" id="{286A1C29-2828-4310-B820-886797DB12A3}"/>
               </a:ext>
             </a:extLst>
           </p:cNvPr>
@@ -14730,7 +14725,7 @@
           <p:cNvPr id="64" name="CuadroTexto 26">
             <a:extLst>
               <a:ext uri="{FF2B5EF4-FFF2-40B4-BE49-F238E27FC236}">
-                <a16:creationId xmlns="" xmlns:a16="http://schemas.microsoft.com/office/drawing/2014/main" id="{91083145-8B20-4DC2-B0C8-80BA773F821D}"/>
+                <a16:creationId xmlns:a16="http://schemas.microsoft.com/office/drawing/2014/main" xmlns="" id="{91083145-8B20-4DC2-B0C8-80BA773F821D}"/>
               </a:ext>
             </a:extLst>
           </p:cNvPr>
@@ -14767,7 +14762,7 @@
           <p:cNvPr id="65" name="CuadroTexto 27">
             <a:extLst>
               <a:ext uri="{FF2B5EF4-FFF2-40B4-BE49-F238E27FC236}">
-                <a16:creationId xmlns="" xmlns:a16="http://schemas.microsoft.com/office/drawing/2014/main" id="{9BC4EDBC-C66C-4D35-B8F6-D0AF6921AE75}"/>
+                <a16:creationId xmlns:a16="http://schemas.microsoft.com/office/drawing/2014/main" xmlns="" id="{9BC4EDBC-C66C-4D35-B8F6-D0AF6921AE75}"/>
               </a:ext>
             </a:extLst>
           </p:cNvPr>
@@ -14804,7 +14799,7 @@
           <p:cNvPr id="66" name="124 Conector recto de flecha">
             <a:extLst>
               <a:ext uri="{FF2B5EF4-FFF2-40B4-BE49-F238E27FC236}">
-                <a16:creationId xmlns="" xmlns:a16="http://schemas.microsoft.com/office/drawing/2014/main" id="{CB24B452-0240-42AD-AB50-081BD3CBEEB9}"/>
+                <a16:creationId xmlns:a16="http://schemas.microsoft.com/office/drawing/2014/main" xmlns="" id="{CB24B452-0240-42AD-AB50-081BD3CBEEB9}"/>
               </a:ext>
             </a:extLst>
           </p:cNvPr>
@@ -14848,7 +14843,7 @@
           <p:cNvPr id="68" name="124 Conector recto de flecha">
             <a:extLst>
               <a:ext uri="{FF2B5EF4-FFF2-40B4-BE49-F238E27FC236}">
-                <a16:creationId xmlns="" xmlns:a16="http://schemas.microsoft.com/office/drawing/2014/main" id="{CB24B452-0240-42AD-AB50-081BD3CBEEB9}"/>
+                <a16:creationId xmlns:a16="http://schemas.microsoft.com/office/drawing/2014/main" xmlns="" id="{CB24B452-0240-42AD-AB50-081BD3CBEEB9}"/>
               </a:ext>
             </a:extLst>
           </p:cNvPr>
@@ -14934,11 +14929,7 @@
             <a:pPr algn="ctr"/>
             <a:r>
               <a:rPr lang="es-ES" sz="2400" smtClean="0"/>
-              <a:t>Bus de c</a:t>
-            </a:r>
-            <a:r>
-              <a:rPr lang="es-ES" sz="2400" smtClean="0"/>
-              <a:t>ontrol  </a:t>
+              <a:t>Bus de control  </a:t>
             </a:r>
             <a:r>
               <a:rPr lang="es-ES" sz="2000" smtClean="0">
@@ -15192,7 +15183,7 @@
     </p:spTree>
     <p:extLst>
       <p:ext uri="{BB962C8B-B14F-4D97-AF65-F5344CB8AC3E}">
-        <p14:creationId xmlns="" xmlns:p14="http://schemas.microsoft.com/office/powerpoint/2010/main" val="890748881"/>
+        <p14:creationId xmlns:p14="http://schemas.microsoft.com/office/powerpoint/2010/main" xmlns="" val="890748881"/>
       </p:ext>
     </p:extLst>
   </p:cSld>
@@ -15597,7 +15588,7 @@
           <p:cNvPr id="4" name="CuadroTexto 19">
             <a:extLst>
               <a:ext uri="{FF2B5EF4-FFF2-40B4-BE49-F238E27FC236}">
-                <a16:creationId xmlns="" xmlns:a16="http://schemas.microsoft.com/office/drawing/2014/main" id="{B81A97C9-B44A-4DCA-962F-3BB6FD3A6362}"/>
+                <a16:creationId xmlns:a16="http://schemas.microsoft.com/office/drawing/2014/main" xmlns="" id="{B81A97C9-B44A-4DCA-962F-3BB6FD3A6362}"/>
               </a:ext>
             </a:extLst>
           </p:cNvPr>
@@ -15686,7 +15677,7 @@
           <p:cNvPr id="41" name="CuadroTexto 19">
             <a:extLst>
               <a:ext uri="{FF2B5EF4-FFF2-40B4-BE49-F238E27FC236}">
-                <a16:creationId xmlns="" xmlns:a16="http://schemas.microsoft.com/office/drawing/2014/main" id="{B81A97C9-B44A-4DCA-962F-3BB6FD3A6362}"/>
+                <a16:creationId xmlns:a16="http://schemas.microsoft.com/office/drawing/2014/main" xmlns="" id="{B81A97C9-B44A-4DCA-962F-3BB6FD3A6362}"/>
               </a:ext>
             </a:extLst>
           </p:cNvPr>
@@ -17492,7 +17483,7 @@
   <a:extraClrSchemeLst/>
   <a:extLst>
     <a:ext uri="{05A4C25C-085E-4340-85A3-A5531E510DB2}">
-      <thm15:themeFamily xmlns="" xmlns:thm15="http://schemas.microsoft.com/office/thememl/2012/main" name="Office Theme" id="{62F939B6-93AF-4DB8-9C6B-D6C7DFDC589F}" vid="{4A3C46E8-61CC-4603-A589-7422A47A8E4A}"/>
+      <thm15:themeFamily xmlns:thm15="http://schemas.microsoft.com/office/thememl/2012/main" xmlns="" name="Office Theme" id="{62F939B6-93AF-4DB8-9C6B-D6C7DFDC589F}" vid="{4A3C46E8-61CC-4603-A589-7422A47A8E4A}"/>
     </a:ext>
   </a:extLst>
 </a:theme>

</xml_diff>